<commit_message>
Whole Process: many chars got mis-recognized
</commit_message>
<xml_diff>
--- a/Flow Chart.pptx
+++ b/Flow Chart.pptx
@@ -259,7 +259,7 @@
           <a:p>
             <a:fld id="{50A8E560-9588-4AA9-A70C-935D55D72753}" type="datetimeFigureOut">
               <a:rPr lang="en-US" smtClean="0"/>
-              <a:t>3/26/2021</a:t>
+              <a:t>4/25/2021</a:t>
             </a:fld>
             <a:endParaRPr lang="en-US"/>
           </a:p>
@@ -457,7 +457,7 @@
           <a:p>
             <a:fld id="{50A8E560-9588-4AA9-A70C-935D55D72753}" type="datetimeFigureOut">
               <a:rPr lang="en-US" smtClean="0"/>
-              <a:t>3/26/2021</a:t>
+              <a:t>4/25/2021</a:t>
             </a:fld>
             <a:endParaRPr lang="en-US"/>
           </a:p>
@@ -665,7 +665,7 @@
           <a:p>
             <a:fld id="{50A8E560-9588-4AA9-A70C-935D55D72753}" type="datetimeFigureOut">
               <a:rPr lang="en-US" smtClean="0"/>
-              <a:t>3/26/2021</a:t>
+              <a:t>4/25/2021</a:t>
             </a:fld>
             <a:endParaRPr lang="en-US"/>
           </a:p>
@@ -863,7 +863,7 @@
           <a:p>
             <a:fld id="{50A8E560-9588-4AA9-A70C-935D55D72753}" type="datetimeFigureOut">
               <a:rPr lang="en-US" smtClean="0"/>
-              <a:t>3/26/2021</a:t>
+              <a:t>4/25/2021</a:t>
             </a:fld>
             <a:endParaRPr lang="en-US"/>
           </a:p>
@@ -1138,7 +1138,7 @@
           <a:p>
             <a:fld id="{50A8E560-9588-4AA9-A70C-935D55D72753}" type="datetimeFigureOut">
               <a:rPr lang="en-US" smtClean="0"/>
-              <a:t>3/26/2021</a:t>
+              <a:t>4/25/2021</a:t>
             </a:fld>
             <a:endParaRPr lang="en-US"/>
           </a:p>
@@ -1403,7 +1403,7 @@
           <a:p>
             <a:fld id="{50A8E560-9588-4AA9-A70C-935D55D72753}" type="datetimeFigureOut">
               <a:rPr lang="en-US" smtClean="0"/>
-              <a:t>3/26/2021</a:t>
+              <a:t>4/25/2021</a:t>
             </a:fld>
             <a:endParaRPr lang="en-US"/>
           </a:p>
@@ -1815,7 +1815,7 @@
           <a:p>
             <a:fld id="{50A8E560-9588-4AA9-A70C-935D55D72753}" type="datetimeFigureOut">
               <a:rPr lang="en-US" smtClean="0"/>
-              <a:t>3/26/2021</a:t>
+              <a:t>4/25/2021</a:t>
             </a:fld>
             <a:endParaRPr lang="en-US"/>
           </a:p>
@@ -1956,7 +1956,7 @@
           <a:p>
             <a:fld id="{50A8E560-9588-4AA9-A70C-935D55D72753}" type="datetimeFigureOut">
               <a:rPr lang="en-US" smtClean="0"/>
-              <a:t>3/26/2021</a:t>
+              <a:t>4/25/2021</a:t>
             </a:fld>
             <a:endParaRPr lang="en-US"/>
           </a:p>
@@ -2069,7 +2069,7 @@
           <a:p>
             <a:fld id="{50A8E560-9588-4AA9-A70C-935D55D72753}" type="datetimeFigureOut">
               <a:rPr lang="en-US" smtClean="0"/>
-              <a:t>3/26/2021</a:t>
+              <a:t>4/25/2021</a:t>
             </a:fld>
             <a:endParaRPr lang="en-US"/>
           </a:p>
@@ -2380,7 +2380,7 @@
           <a:p>
             <a:fld id="{50A8E560-9588-4AA9-A70C-935D55D72753}" type="datetimeFigureOut">
               <a:rPr lang="en-US" smtClean="0"/>
-              <a:t>3/26/2021</a:t>
+              <a:t>4/25/2021</a:t>
             </a:fld>
             <a:endParaRPr lang="en-US"/>
           </a:p>
@@ -2668,7 +2668,7 @@
           <a:p>
             <a:fld id="{50A8E560-9588-4AA9-A70C-935D55D72753}" type="datetimeFigureOut">
               <a:rPr lang="en-US" smtClean="0"/>
-              <a:t>3/26/2021</a:t>
+              <a:t>4/25/2021</a:t>
             </a:fld>
             <a:endParaRPr lang="en-US"/>
           </a:p>
@@ -2909,7 +2909,7 @@
           <a:p>
             <a:fld id="{50A8E560-9588-4AA9-A70C-935D55D72753}" type="datetimeFigureOut">
               <a:rPr lang="en-US" smtClean="0"/>
-              <a:t>3/26/2021</a:t>
+              <a:t>4/25/2021</a:t>
             </a:fld>
             <a:endParaRPr lang="en-US"/>
           </a:p>
@@ -3326,1602 +3326,1673 @@
           <a:chExt cx="0" cy="0"/>
         </a:xfrm>
       </p:grpSpPr>
-      <p:sp>
-        <p:nvSpPr>
-          <p:cNvPr id="67" name="Arrow: Right 66">
-            <a:extLst>
-              <a:ext uri="{FF2B5EF4-FFF2-40B4-BE49-F238E27FC236}">
-                <a16:creationId xmlns:a16="http://schemas.microsoft.com/office/drawing/2014/main" id="{14A2CE88-3057-4278-AE7A-8F7FD228915D}"/>
-              </a:ext>
-            </a:extLst>
-          </p:cNvPr>
-          <p:cNvSpPr/>
+      <p:grpSp>
+        <p:nvGrpSpPr>
+          <p:cNvPr id="3" name="Group 2">
+            <a:extLst>
+              <a:ext uri="{FF2B5EF4-FFF2-40B4-BE49-F238E27FC236}">
+                <a16:creationId xmlns:a16="http://schemas.microsoft.com/office/drawing/2014/main" id="{AF1EB391-0A7A-4A00-96CE-D672C513C493}"/>
+              </a:ext>
+            </a:extLst>
+          </p:cNvPr>
+          <p:cNvGrpSpPr/>
           <p:nvPr/>
-        </p:nvSpPr>
-        <p:spPr>
-          <a:xfrm>
-            <a:off x="6117514" y="1523192"/>
-            <a:ext cx="1963524" cy="291919"/>
-          </a:xfrm>
-          <a:prstGeom prst="rightArrow">
-            <a:avLst/>
-          </a:prstGeom>
-        </p:spPr>
-        <p:style>
-          <a:lnRef idx="1">
-            <a:schemeClr val="accent3"/>
-          </a:lnRef>
-          <a:fillRef idx="2">
-            <a:schemeClr val="accent3"/>
-          </a:fillRef>
-          <a:effectRef idx="1">
-            <a:schemeClr val="accent3"/>
-          </a:effectRef>
-          <a:fontRef idx="minor">
-            <a:schemeClr val="dk1"/>
-          </a:fontRef>
-        </p:style>
-        <p:txBody>
-          <a:bodyPr rtlCol="0" anchor="ctr"/>
-          <a:lstStyle/>
-          <a:p>
-            <a:pPr algn="ctr"/>
-            <a:endParaRPr lang="en-US"/>
-          </a:p>
-        </p:txBody>
-      </p:sp>
-      <p:sp>
-        <p:nvSpPr>
-          <p:cNvPr id="63" name="Arrow: Right 62">
-            <a:extLst>
-              <a:ext uri="{FF2B5EF4-FFF2-40B4-BE49-F238E27FC236}">
-                <a16:creationId xmlns:a16="http://schemas.microsoft.com/office/drawing/2014/main" id="{62171E70-FA2B-4032-B421-30D334C53178}"/>
-              </a:ext>
-            </a:extLst>
-          </p:cNvPr>
-          <p:cNvSpPr/>
-          <p:nvPr/>
-        </p:nvSpPr>
-        <p:spPr>
-          <a:xfrm rot="10800000">
-            <a:off x="9406035" y="5132855"/>
-            <a:ext cx="1138333" cy="291919"/>
-          </a:xfrm>
-          <a:prstGeom prst="rightArrow">
-            <a:avLst/>
-          </a:prstGeom>
-        </p:spPr>
-        <p:style>
-          <a:lnRef idx="1">
-            <a:schemeClr val="accent3"/>
-          </a:lnRef>
-          <a:fillRef idx="2">
-            <a:schemeClr val="accent3"/>
-          </a:fillRef>
-          <a:effectRef idx="1">
-            <a:schemeClr val="accent3"/>
-          </a:effectRef>
-          <a:fontRef idx="minor">
-            <a:schemeClr val="dk1"/>
-          </a:fontRef>
-        </p:style>
-        <p:txBody>
-          <a:bodyPr rtlCol="0" anchor="ctr"/>
-          <a:lstStyle/>
-          <a:p>
-            <a:pPr algn="ctr"/>
-            <a:endParaRPr lang="en-US"/>
-          </a:p>
-        </p:txBody>
-      </p:sp>
-      <p:sp>
-        <p:nvSpPr>
-          <p:cNvPr id="66" name="Arrow: Right 65">
-            <a:extLst>
-              <a:ext uri="{FF2B5EF4-FFF2-40B4-BE49-F238E27FC236}">
-                <a16:creationId xmlns:a16="http://schemas.microsoft.com/office/drawing/2014/main" id="{CC10F384-9969-44E8-823C-94C0B4D5CBF4}"/>
-              </a:ext>
-            </a:extLst>
-          </p:cNvPr>
-          <p:cNvSpPr/>
-          <p:nvPr/>
-        </p:nvSpPr>
-        <p:spPr>
-          <a:xfrm rot="5400000">
-            <a:off x="10007942" y="4617917"/>
-            <a:ext cx="1321798" cy="291919"/>
-          </a:xfrm>
-          <a:prstGeom prst="rightArrow">
-            <a:avLst/>
-          </a:prstGeom>
-        </p:spPr>
-        <p:style>
-          <a:lnRef idx="1">
-            <a:schemeClr val="accent3"/>
-          </a:lnRef>
-          <a:fillRef idx="2">
-            <a:schemeClr val="accent3"/>
-          </a:fillRef>
-          <a:effectRef idx="1">
-            <a:schemeClr val="accent3"/>
-          </a:effectRef>
-          <a:fontRef idx="minor">
-            <a:schemeClr val="dk1"/>
-          </a:fontRef>
-        </p:style>
-        <p:txBody>
-          <a:bodyPr rtlCol="0" anchor="ctr"/>
-          <a:lstStyle/>
-          <a:p>
-            <a:pPr algn="ctr"/>
-            <a:endParaRPr lang="en-US"/>
-          </a:p>
-        </p:txBody>
-      </p:sp>
-      <p:sp>
-        <p:nvSpPr>
-          <p:cNvPr id="64" name="Arrow: Right 63">
-            <a:extLst>
-              <a:ext uri="{FF2B5EF4-FFF2-40B4-BE49-F238E27FC236}">
-                <a16:creationId xmlns:a16="http://schemas.microsoft.com/office/drawing/2014/main" id="{D8DC8146-A9F8-41EB-94EC-C68EDC8450D5}"/>
-              </a:ext>
-            </a:extLst>
-          </p:cNvPr>
-          <p:cNvSpPr/>
-          <p:nvPr/>
-        </p:nvSpPr>
-        <p:spPr>
-          <a:xfrm rot="10800000">
-            <a:off x="1964101" y="3759002"/>
-            <a:ext cx="1968109" cy="291919"/>
-          </a:xfrm>
-          <a:prstGeom prst="rightArrow">
-            <a:avLst/>
-          </a:prstGeom>
-        </p:spPr>
-        <p:style>
-          <a:lnRef idx="1">
-            <a:schemeClr val="accent3"/>
-          </a:lnRef>
-          <a:fillRef idx="2">
-            <a:schemeClr val="accent3"/>
-          </a:fillRef>
-          <a:effectRef idx="1">
-            <a:schemeClr val="accent3"/>
-          </a:effectRef>
-          <a:fontRef idx="minor">
-            <a:schemeClr val="dk1"/>
-          </a:fontRef>
-        </p:style>
-        <p:txBody>
-          <a:bodyPr rtlCol="0" anchor="ctr"/>
-          <a:lstStyle/>
-          <a:p>
-            <a:pPr algn="ctr"/>
-            <a:endParaRPr lang="en-US"/>
-          </a:p>
-        </p:txBody>
-      </p:sp>
-      <p:sp>
-        <p:nvSpPr>
-          <p:cNvPr id="62" name="Arrow: Right 61">
-            <a:extLst>
-              <a:ext uri="{FF2B5EF4-FFF2-40B4-BE49-F238E27FC236}">
-                <a16:creationId xmlns:a16="http://schemas.microsoft.com/office/drawing/2014/main" id="{E3736C6F-3788-4C38-8AA9-743E0A12701B}"/>
-              </a:ext>
-            </a:extLst>
-          </p:cNvPr>
-          <p:cNvSpPr/>
-          <p:nvPr/>
-        </p:nvSpPr>
-        <p:spPr>
-          <a:xfrm rot="10800000">
-            <a:off x="4249455" y="3760647"/>
-            <a:ext cx="3930451" cy="291919"/>
-          </a:xfrm>
-          <a:prstGeom prst="rightArrow">
-            <a:avLst/>
-          </a:prstGeom>
-        </p:spPr>
-        <p:style>
-          <a:lnRef idx="1">
-            <a:schemeClr val="accent3"/>
-          </a:lnRef>
-          <a:fillRef idx="2">
-            <a:schemeClr val="accent3"/>
-          </a:fillRef>
-          <a:effectRef idx="1">
-            <a:schemeClr val="accent3"/>
-          </a:effectRef>
-          <a:fontRef idx="minor">
-            <a:schemeClr val="dk1"/>
-          </a:fontRef>
-        </p:style>
-        <p:txBody>
-          <a:bodyPr rtlCol="0" anchor="ctr"/>
-          <a:lstStyle/>
-          <a:p>
-            <a:pPr algn="ctr"/>
-            <a:endParaRPr lang="en-US"/>
-          </a:p>
-        </p:txBody>
-      </p:sp>
-      <p:sp>
-        <p:nvSpPr>
-          <p:cNvPr id="59" name="Arrow: Right 58">
-            <a:extLst>
-              <a:ext uri="{FF2B5EF4-FFF2-40B4-BE49-F238E27FC236}">
-                <a16:creationId xmlns:a16="http://schemas.microsoft.com/office/drawing/2014/main" id="{2A709EBA-E819-4646-BF92-418F85CD1925}"/>
-              </a:ext>
-            </a:extLst>
-          </p:cNvPr>
-          <p:cNvSpPr/>
-          <p:nvPr/>
-        </p:nvSpPr>
-        <p:spPr>
-          <a:xfrm rot="5400000">
-            <a:off x="9734875" y="2608441"/>
-            <a:ext cx="1878575" cy="291919"/>
-          </a:xfrm>
-          <a:prstGeom prst="rightArrow">
-            <a:avLst/>
-          </a:prstGeom>
-        </p:spPr>
-        <p:style>
-          <a:lnRef idx="1">
-            <a:schemeClr val="accent3"/>
-          </a:lnRef>
-          <a:fillRef idx="2">
-            <a:schemeClr val="accent3"/>
-          </a:fillRef>
-          <a:effectRef idx="1">
-            <a:schemeClr val="accent3"/>
-          </a:effectRef>
-          <a:fontRef idx="minor">
-            <a:schemeClr val="dk1"/>
-          </a:fontRef>
-        </p:style>
-        <p:txBody>
-          <a:bodyPr rtlCol="0" anchor="ctr"/>
-          <a:lstStyle/>
-          <a:p>
-            <a:pPr algn="ctr"/>
-            <a:endParaRPr lang="en-US"/>
-          </a:p>
-        </p:txBody>
-      </p:sp>
-      <p:sp>
-        <p:nvSpPr>
-          <p:cNvPr id="58" name="Arrow: Right 57">
-            <a:extLst>
-              <a:ext uri="{FF2B5EF4-FFF2-40B4-BE49-F238E27FC236}">
-                <a16:creationId xmlns:a16="http://schemas.microsoft.com/office/drawing/2014/main" id="{7C571D39-F928-4777-9F14-CCF9112F8985}"/>
-              </a:ext>
-            </a:extLst>
-          </p:cNvPr>
-          <p:cNvSpPr/>
-          <p:nvPr/>
-        </p:nvSpPr>
-        <p:spPr>
-          <a:xfrm>
-            <a:off x="9479168" y="1523192"/>
-            <a:ext cx="809387" cy="291919"/>
-          </a:xfrm>
-          <a:prstGeom prst="rightArrow">
-            <a:avLst/>
-          </a:prstGeom>
-        </p:spPr>
-        <p:style>
-          <a:lnRef idx="1">
-            <a:schemeClr val="accent3"/>
-          </a:lnRef>
-          <a:fillRef idx="2">
-            <a:schemeClr val="accent3"/>
-          </a:fillRef>
-          <a:effectRef idx="1">
-            <a:schemeClr val="accent3"/>
-          </a:effectRef>
-          <a:fontRef idx="minor">
-            <a:schemeClr val="dk1"/>
-          </a:fontRef>
-        </p:style>
-        <p:txBody>
-          <a:bodyPr rtlCol="0" anchor="ctr"/>
-          <a:lstStyle/>
-          <a:p>
-            <a:pPr algn="ctr"/>
-            <a:endParaRPr lang="en-US"/>
-          </a:p>
-        </p:txBody>
-      </p:sp>
-      <p:sp>
-        <p:nvSpPr>
-          <p:cNvPr id="57" name="Arrow: Right 56">
-            <a:extLst>
-              <a:ext uri="{FF2B5EF4-FFF2-40B4-BE49-F238E27FC236}">
-                <a16:creationId xmlns:a16="http://schemas.microsoft.com/office/drawing/2014/main" id="{370B115F-BC0E-4C7A-8F53-20EC2854AA74}"/>
-              </a:ext>
-            </a:extLst>
-          </p:cNvPr>
-          <p:cNvSpPr/>
-          <p:nvPr/>
-        </p:nvSpPr>
-        <p:spPr>
-          <a:xfrm>
-            <a:off x="2446181" y="1550869"/>
-            <a:ext cx="2400922" cy="291919"/>
-          </a:xfrm>
-          <a:prstGeom prst="rightArrow">
-            <a:avLst/>
-          </a:prstGeom>
-        </p:spPr>
-        <p:style>
-          <a:lnRef idx="1">
-            <a:schemeClr val="accent3"/>
-          </a:lnRef>
-          <a:fillRef idx="2">
-            <a:schemeClr val="accent3"/>
-          </a:fillRef>
-          <a:effectRef idx="1">
-            <a:schemeClr val="accent3"/>
-          </a:effectRef>
-          <a:fontRef idx="minor">
-            <a:schemeClr val="dk1"/>
-          </a:fontRef>
-        </p:style>
-        <p:txBody>
-          <a:bodyPr rtlCol="0" anchor="ctr"/>
-          <a:lstStyle/>
-          <a:p>
-            <a:pPr algn="ctr"/>
-            <a:endParaRPr lang="en-US"/>
-          </a:p>
-        </p:txBody>
-      </p:sp>
-      <p:sp>
-        <p:nvSpPr>
-          <p:cNvPr id="32" name="Rectangle 31">
-            <a:extLst>
-              <a:ext uri="{FF2B5EF4-FFF2-40B4-BE49-F238E27FC236}">
-                <a16:creationId xmlns:a16="http://schemas.microsoft.com/office/drawing/2014/main" id="{440C3642-173E-49E7-A6D6-5341ED964659}"/>
-              </a:ext>
-            </a:extLst>
-          </p:cNvPr>
-          <p:cNvSpPr/>
-          <p:nvPr/>
-        </p:nvSpPr>
-        <p:spPr>
-          <a:xfrm>
-            <a:off x="8254483" y="3583254"/>
-            <a:ext cx="1138334" cy="578573"/>
-          </a:xfrm>
-          <a:prstGeom prst="rect">
-            <a:avLst/>
-          </a:prstGeom>
-          <a:solidFill>
-            <a:schemeClr val="accent5">
-              <a:lumMod val="20000"/>
-              <a:lumOff val="80000"/>
-            </a:schemeClr>
-          </a:solidFill>
-        </p:spPr>
-        <p:style>
-          <a:lnRef idx="1">
-            <a:schemeClr val="accent5"/>
-          </a:lnRef>
-          <a:fillRef idx="2">
-            <a:schemeClr val="accent5"/>
-          </a:fillRef>
-          <a:effectRef idx="1">
-            <a:schemeClr val="accent5"/>
-          </a:effectRef>
-          <a:fontRef idx="minor">
-            <a:schemeClr val="dk1"/>
-          </a:fontRef>
-        </p:style>
-        <p:txBody>
-          <a:bodyPr rtlCol="0" anchor="ctr"/>
-          <a:lstStyle/>
-          <a:p>
-            <a:pPr algn="ctr"/>
-            <a:endParaRPr lang="en-US" dirty="0"/>
-          </a:p>
-        </p:txBody>
-      </p:sp>
-      <p:sp>
-        <p:nvSpPr>
-          <p:cNvPr id="30" name="Rectangle 29">
-            <a:extLst>
-              <a:ext uri="{FF2B5EF4-FFF2-40B4-BE49-F238E27FC236}">
-                <a16:creationId xmlns:a16="http://schemas.microsoft.com/office/drawing/2014/main" id="{8A1A1891-E63D-4231-B3B8-359932AC080A}"/>
-              </a:ext>
-            </a:extLst>
-          </p:cNvPr>
-          <p:cNvSpPr/>
-          <p:nvPr/>
-        </p:nvSpPr>
-        <p:spPr>
-          <a:xfrm>
-            <a:off x="9983699" y="2444423"/>
-            <a:ext cx="1380930" cy="686147"/>
-          </a:xfrm>
-          <a:prstGeom prst="rect">
-            <a:avLst/>
-          </a:prstGeom>
-          <a:solidFill>
-            <a:schemeClr val="accent5">
-              <a:lumMod val="20000"/>
-              <a:lumOff val="80000"/>
-            </a:schemeClr>
-          </a:solidFill>
-        </p:spPr>
-        <p:style>
-          <a:lnRef idx="1">
-            <a:schemeClr val="accent5"/>
-          </a:lnRef>
-          <a:fillRef idx="2">
-            <a:schemeClr val="accent5"/>
-          </a:fillRef>
-          <a:effectRef idx="1">
-            <a:schemeClr val="accent5"/>
-          </a:effectRef>
-          <a:fontRef idx="minor">
-            <a:schemeClr val="dk1"/>
-          </a:fontRef>
-        </p:style>
-        <p:txBody>
-          <a:bodyPr rtlCol="0" anchor="ctr"/>
-          <a:lstStyle/>
-          <a:p>
-            <a:pPr algn="ctr"/>
-            <a:endParaRPr lang="en-US" dirty="0"/>
-          </a:p>
-        </p:txBody>
-      </p:sp>
-      <p:sp>
-        <p:nvSpPr>
-          <p:cNvPr id="29" name="Rectangle 28">
-            <a:extLst>
-              <a:ext uri="{FF2B5EF4-FFF2-40B4-BE49-F238E27FC236}">
-                <a16:creationId xmlns:a16="http://schemas.microsoft.com/office/drawing/2014/main" id="{FA9D537C-E120-4950-9C7B-5211949DDED5}"/>
-              </a:ext>
-            </a:extLst>
-          </p:cNvPr>
-          <p:cNvSpPr/>
-          <p:nvPr/>
-        </p:nvSpPr>
-        <p:spPr>
-          <a:xfrm>
-            <a:off x="9996141" y="1368659"/>
-            <a:ext cx="1368488" cy="578573"/>
-          </a:xfrm>
-          <a:prstGeom prst="rect">
-            <a:avLst/>
-          </a:prstGeom>
-          <a:solidFill>
-            <a:schemeClr val="accent5">
-              <a:lumMod val="20000"/>
-              <a:lumOff val="80000"/>
-            </a:schemeClr>
-          </a:solidFill>
-        </p:spPr>
-        <p:style>
-          <a:lnRef idx="1">
-            <a:schemeClr val="accent5"/>
-          </a:lnRef>
-          <a:fillRef idx="2">
-            <a:schemeClr val="accent5"/>
-          </a:fillRef>
-          <a:effectRef idx="1">
-            <a:schemeClr val="accent5"/>
-          </a:effectRef>
-          <a:fontRef idx="minor">
-            <a:schemeClr val="dk1"/>
-          </a:fontRef>
-        </p:style>
-        <p:txBody>
-          <a:bodyPr rtlCol="0" anchor="ctr"/>
-          <a:lstStyle/>
-          <a:p>
-            <a:pPr algn="ctr"/>
-            <a:endParaRPr lang="en-US" dirty="0"/>
-          </a:p>
-        </p:txBody>
-      </p:sp>
-      <p:sp>
-        <p:nvSpPr>
-          <p:cNvPr id="22" name="Rectangle 21">
-            <a:extLst>
-              <a:ext uri="{FF2B5EF4-FFF2-40B4-BE49-F238E27FC236}">
-                <a16:creationId xmlns:a16="http://schemas.microsoft.com/office/drawing/2014/main" id="{98A0A358-CB3F-4100-AA2A-324DA0F08DE6}"/>
-              </a:ext>
-            </a:extLst>
-          </p:cNvPr>
-          <p:cNvSpPr/>
-          <p:nvPr/>
-        </p:nvSpPr>
-        <p:spPr>
-          <a:xfrm>
-            <a:off x="4889243" y="1396336"/>
-            <a:ext cx="1138334" cy="578573"/>
-          </a:xfrm>
-          <a:prstGeom prst="rect">
-            <a:avLst/>
-          </a:prstGeom>
-          <a:solidFill>
-            <a:schemeClr val="accent5">
-              <a:lumMod val="20000"/>
-              <a:lumOff val="80000"/>
-            </a:schemeClr>
-          </a:solidFill>
-        </p:spPr>
-        <p:style>
-          <a:lnRef idx="1">
-            <a:schemeClr val="accent5"/>
-          </a:lnRef>
-          <a:fillRef idx="2">
-            <a:schemeClr val="accent5"/>
-          </a:fillRef>
-          <a:effectRef idx="1">
-            <a:schemeClr val="accent5"/>
-          </a:effectRef>
-          <a:fontRef idx="minor">
-            <a:schemeClr val="dk1"/>
-          </a:fontRef>
-        </p:style>
-        <p:txBody>
-          <a:bodyPr rtlCol="0" anchor="ctr"/>
-          <a:lstStyle/>
-          <a:p>
-            <a:pPr algn="ctr"/>
-            <a:endParaRPr lang="en-US" dirty="0"/>
-          </a:p>
-        </p:txBody>
-      </p:sp>
-      <p:pic>
-        <p:nvPicPr>
-          <p:cNvPr id="11" name="Picture 10">
-            <a:extLst>
-              <a:ext uri="{FF2B5EF4-FFF2-40B4-BE49-F238E27FC236}">
-                <a16:creationId xmlns:a16="http://schemas.microsoft.com/office/drawing/2014/main" id="{833ABEA5-0835-4EFD-B80E-05A53548E547}"/>
-              </a:ext>
-            </a:extLst>
-          </p:cNvPr>
-          <p:cNvPicPr>
-            <a:picLocks noChangeAspect="1"/>
-          </p:cNvPicPr>
-          <p:nvPr/>
-        </p:nvPicPr>
-        <p:blipFill>
-          <a:blip r:embed="rId2"/>
-          <a:stretch>
-            <a:fillRect/>
-          </a:stretch>
-        </p:blipFill>
-        <p:spPr>
+        </p:nvGrpSpPr>
+        <p:grpSpPr>
           <a:xfrm>
             <a:off x="547756" y="1124578"/>
-            <a:ext cx="1878208" cy="1077446"/>
+            <a:ext cx="11044476" cy="4495625"/>
+            <a:chOff x="547756" y="1124578"/>
+            <a:chExt cx="11044476" cy="4495625"/>
           </a:xfrm>
-          <a:prstGeom prst="rect">
-            <a:avLst/>
-          </a:prstGeom>
-        </p:spPr>
-      </p:pic>
-      <p:pic>
-        <p:nvPicPr>
-          <p:cNvPr id="13" name="Picture 12" descr="A picture containing text&#10;&#10;Description automatically generated">
-            <a:extLst>
-              <a:ext uri="{FF2B5EF4-FFF2-40B4-BE49-F238E27FC236}">
-                <a16:creationId xmlns:a16="http://schemas.microsoft.com/office/drawing/2014/main" id="{8A72E5CE-C238-405A-A261-8B65C2B83617}"/>
-              </a:ext>
-            </a:extLst>
-          </p:cNvPr>
-          <p:cNvPicPr>
-            <a:picLocks noChangeAspect="1"/>
-          </p:cNvPicPr>
-          <p:nvPr/>
-        </p:nvPicPr>
-        <p:blipFill>
-          <a:blip r:embed="rId3">
-            <a:extLst>
-              <a:ext uri="{28A0092B-C50C-407E-A947-70E740481C1C}">
-                <a14:useLocalDpi xmlns:a14="http://schemas.microsoft.com/office/drawing/2010/main" val="0"/>
-              </a:ext>
-            </a:extLst>
-          </a:blip>
-          <a:stretch>
-            <a:fillRect/>
-          </a:stretch>
-        </p:blipFill>
-        <p:spPr>
-          <a:xfrm>
-            <a:off x="8081038" y="1314299"/>
-            <a:ext cx="1385690" cy="698003"/>
-          </a:xfrm>
-          <a:prstGeom prst="rect">
-            <a:avLst/>
-          </a:prstGeom>
-        </p:spPr>
-      </p:pic>
-      <p:pic>
-        <p:nvPicPr>
-          <p:cNvPr id="14" name="Picture 13">
-            <a:extLst>
-              <a:ext uri="{FF2B5EF4-FFF2-40B4-BE49-F238E27FC236}">
-                <a16:creationId xmlns:a16="http://schemas.microsoft.com/office/drawing/2014/main" id="{AA0C53AC-C4F3-42F6-B108-9B77A45C2CFB}"/>
-              </a:ext>
-            </a:extLst>
-          </p:cNvPr>
-          <p:cNvPicPr/>
-          <p:nvPr/>
-        </p:nvPicPr>
-        <p:blipFill>
-          <a:blip r:embed="rId4"/>
-          <a:stretch>
-            <a:fillRect/>
-          </a:stretch>
-        </p:blipFill>
-        <p:spPr>
-          <a:xfrm>
-            <a:off x="6502973" y="3679820"/>
-            <a:ext cx="1371600" cy="431165"/>
-          </a:xfrm>
-          <a:prstGeom prst="rect">
-            <a:avLst/>
-          </a:prstGeom>
-        </p:spPr>
-      </p:pic>
-      <p:pic>
-        <p:nvPicPr>
-          <p:cNvPr id="16" name="Picture 15">
-            <a:extLst>
-              <a:ext uri="{FF2B5EF4-FFF2-40B4-BE49-F238E27FC236}">
-                <a16:creationId xmlns:a16="http://schemas.microsoft.com/office/drawing/2014/main" id="{81D4980E-AFD8-48F8-8D33-8E326B4928C9}"/>
-              </a:ext>
-            </a:extLst>
-          </p:cNvPr>
-          <p:cNvPicPr>
-            <a:picLocks noChangeAspect="1"/>
-          </p:cNvPicPr>
-          <p:nvPr/>
-        </p:nvPicPr>
-        <p:blipFill>
-          <a:blip r:embed="rId5"/>
-          <a:stretch>
-            <a:fillRect/>
-          </a:stretch>
-        </p:blipFill>
-        <p:spPr>
-          <a:xfrm>
-            <a:off x="9983699" y="3727431"/>
-            <a:ext cx="1385690" cy="341804"/>
-          </a:xfrm>
-          <a:prstGeom prst="rect">
-            <a:avLst/>
-          </a:prstGeom>
-        </p:spPr>
-      </p:pic>
-      <p:sp>
-        <p:nvSpPr>
-          <p:cNvPr id="17" name="Rectangle 16">
-            <a:extLst>
-              <a:ext uri="{FF2B5EF4-FFF2-40B4-BE49-F238E27FC236}">
-                <a16:creationId xmlns:a16="http://schemas.microsoft.com/office/drawing/2014/main" id="{460CB18F-BBFA-4344-B306-5CFB6F54A47E}"/>
-              </a:ext>
-            </a:extLst>
-          </p:cNvPr>
-          <p:cNvSpPr/>
-          <p:nvPr/>
-        </p:nvSpPr>
-        <p:spPr>
-          <a:xfrm>
-            <a:off x="2724542" y="1382723"/>
-            <a:ext cx="1138334" cy="578573"/>
-          </a:xfrm>
-          <a:prstGeom prst="rect">
-            <a:avLst/>
-          </a:prstGeom>
-          <a:solidFill>
-            <a:schemeClr val="accent5">
-              <a:lumMod val="20000"/>
-              <a:lumOff val="80000"/>
-            </a:schemeClr>
-          </a:solidFill>
-        </p:spPr>
-        <p:style>
-          <a:lnRef idx="1">
-            <a:schemeClr val="accent5"/>
-          </a:lnRef>
-          <a:fillRef idx="2">
-            <a:schemeClr val="accent5"/>
-          </a:fillRef>
-          <a:effectRef idx="1">
-            <a:schemeClr val="accent5"/>
-          </a:effectRef>
-          <a:fontRef idx="minor">
-            <a:schemeClr val="dk1"/>
-          </a:fontRef>
-        </p:style>
-        <p:txBody>
-          <a:bodyPr rtlCol="0" anchor="ctr"/>
-          <a:lstStyle/>
-          <a:p>
-            <a:pPr algn="ctr"/>
-            <a:endParaRPr lang="en-US" dirty="0"/>
-          </a:p>
-        </p:txBody>
-      </p:sp>
-      <p:sp>
-        <p:nvSpPr>
-          <p:cNvPr id="18" name="TextBox 17">
-            <a:extLst>
-              <a:ext uri="{FF2B5EF4-FFF2-40B4-BE49-F238E27FC236}">
-                <a16:creationId xmlns:a16="http://schemas.microsoft.com/office/drawing/2014/main" id="{6CC86B72-7A22-463A-A645-FFC2449450C6}"/>
-              </a:ext>
-            </a:extLst>
-          </p:cNvPr>
-          <p:cNvSpPr txBox="1"/>
-          <p:nvPr/>
-        </p:nvSpPr>
-        <p:spPr>
-          <a:xfrm>
-            <a:off x="2724542" y="1438076"/>
-            <a:ext cx="1138334" cy="523220"/>
-          </a:xfrm>
-          <a:prstGeom prst="rect">
-            <a:avLst/>
-          </a:prstGeom>
-          <a:noFill/>
-        </p:spPr>
-        <p:txBody>
-          <a:bodyPr wrap="square" rtlCol="0">
-            <a:spAutoFit/>
-          </a:bodyPr>
-          <a:lstStyle/>
-          <a:p>
-            <a:pPr algn="ctr"/>
-            <a:r>
-              <a:rPr lang="en-US" sz="1400" b="1" dirty="0"/>
-              <a:t>Rectangle </a:t>
-            </a:r>
-          </a:p>
-          <a:p>
-            <a:pPr algn="ctr"/>
-            <a:r>
-              <a:rPr lang="en-US" sz="1400" b="1" dirty="0"/>
-              <a:t>detection</a:t>
-            </a:r>
-          </a:p>
-        </p:txBody>
-      </p:sp>
-      <p:sp>
-        <p:nvSpPr>
-          <p:cNvPr id="19" name="TextBox 18">
-            <a:extLst>
-              <a:ext uri="{FF2B5EF4-FFF2-40B4-BE49-F238E27FC236}">
-                <a16:creationId xmlns:a16="http://schemas.microsoft.com/office/drawing/2014/main" id="{31007203-F038-45D4-BBF4-4E55CF9D08E4}"/>
-              </a:ext>
-            </a:extLst>
-          </p:cNvPr>
-          <p:cNvSpPr txBox="1"/>
-          <p:nvPr/>
-        </p:nvSpPr>
-        <p:spPr>
-          <a:xfrm>
-            <a:off x="9983700" y="1396336"/>
-            <a:ext cx="1380929" cy="523220"/>
-          </a:xfrm>
-          <a:prstGeom prst="rect">
-            <a:avLst/>
-          </a:prstGeom>
-          <a:noFill/>
-        </p:spPr>
-        <p:txBody>
-          <a:bodyPr wrap="square" rtlCol="0">
-            <a:spAutoFit/>
-          </a:bodyPr>
-          <a:lstStyle/>
-          <a:p>
-            <a:pPr algn="ctr"/>
-            <a:r>
-              <a:rPr lang="en-US" sz="1400" b="1" dirty="0"/>
-              <a:t>Extract top and bottom parts</a:t>
-            </a:r>
-          </a:p>
-        </p:txBody>
-      </p:sp>
-      <p:sp>
-        <p:nvSpPr>
-          <p:cNvPr id="20" name="TextBox 19">
-            <a:extLst>
-              <a:ext uri="{FF2B5EF4-FFF2-40B4-BE49-F238E27FC236}">
-                <a16:creationId xmlns:a16="http://schemas.microsoft.com/office/drawing/2014/main" id="{0C244B63-D510-4E28-904D-01BD747228FE}"/>
-              </a:ext>
-            </a:extLst>
-          </p:cNvPr>
-          <p:cNvSpPr txBox="1"/>
-          <p:nvPr/>
-        </p:nvSpPr>
-        <p:spPr>
-          <a:xfrm>
-            <a:off x="3862876" y="1377846"/>
-            <a:ext cx="1026367" cy="307777"/>
-          </a:xfrm>
-          <a:prstGeom prst="rect">
-            <a:avLst/>
-          </a:prstGeom>
-          <a:noFill/>
-        </p:spPr>
-        <p:txBody>
-          <a:bodyPr wrap="square" rtlCol="0">
-            <a:spAutoFit/>
-          </a:bodyPr>
-          <a:lstStyle/>
-          <a:p>
-            <a:pPr algn="ctr"/>
-            <a:r>
-              <a:rPr lang="en-US" sz="1400" dirty="0"/>
-              <a:t>candidates</a:t>
-            </a:r>
-          </a:p>
-        </p:txBody>
-      </p:sp>
-      <p:sp>
-        <p:nvSpPr>
-          <p:cNvPr id="21" name="TextBox 20">
-            <a:extLst>
-              <a:ext uri="{FF2B5EF4-FFF2-40B4-BE49-F238E27FC236}">
-                <a16:creationId xmlns:a16="http://schemas.microsoft.com/office/drawing/2014/main" id="{696691DD-5EFE-4798-B2CF-B73EC23A0A50}"/>
-              </a:ext>
-            </a:extLst>
-          </p:cNvPr>
-          <p:cNvSpPr txBox="1"/>
-          <p:nvPr/>
-        </p:nvSpPr>
-        <p:spPr>
-          <a:xfrm>
-            <a:off x="4924156" y="1438076"/>
-            <a:ext cx="1026367" cy="523220"/>
-          </a:xfrm>
-          <a:prstGeom prst="rect">
-            <a:avLst/>
-          </a:prstGeom>
-          <a:noFill/>
-        </p:spPr>
-        <p:txBody>
-          <a:bodyPr wrap="square" rtlCol="0">
-            <a:spAutoFit/>
-          </a:bodyPr>
-          <a:lstStyle/>
-          <a:p>
-            <a:pPr algn="ctr"/>
-            <a:r>
-              <a:rPr lang="en-US" sz="1400" b="1" dirty="0"/>
-              <a:t>Size/Shape Filter</a:t>
-            </a:r>
-          </a:p>
-        </p:txBody>
-      </p:sp>
-      <p:sp>
-        <p:nvSpPr>
-          <p:cNvPr id="23" name="Rectangle 22">
-            <a:extLst>
-              <a:ext uri="{FF2B5EF4-FFF2-40B4-BE49-F238E27FC236}">
-                <a16:creationId xmlns:a16="http://schemas.microsoft.com/office/drawing/2014/main" id="{B702F702-55ED-40D4-811D-368213A15699}"/>
-              </a:ext>
-            </a:extLst>
-          </p:cNvPr>
-          <p:cNvSpPr/>
-          <p:nvPr/>
-        </p:nvSpPr>
-        <p:spPr>
-          <a:xfrm>
-            <a:off x="6506549" y="1124578"/>
-            <a:ext cx="1138334" cy="954107"/>
-          </a:xfrm>
-          <a:prstGeom prst="rect">
-            <a:avLst/>
-          </a:prstGeom>
-        </p:spPr>
-        <p:style>
-          <a:lnRef idx="1">
-            <a:schemeClr val="accent4"/>
-          </a:lnRef>
-          <a:fillRef idx="2">
-            <a:schemeClr val="accent4"/>
-          </a:fillRef>
-          <a:effectRef idx="1">
-            <a:schemeClr val="accent4"/>
-          </a:effectRef>
-          <a:fontRef idx="minor">
-            <a:schemeClr val="dk1"/>
-          </a:fontRef>
-        </p:style>
-        <p:txBody>
-          <a:bodyPr rtlCol="0" anchor="ctr"/>
-          <a:lstStyle/>
-          <a:p>
-            <a:pPr algn="ctr"/>
-            <a:endParaRPr lang="en-US" dirty="0"/>
-          </a:p>
-        </p:txBody>
-      </p:sp>
-      <p:sp>
-        <p:nvSpPr>
-          <p:cNvPr id="24" name="TextBox 23">
-            <a:extLst>
-              <a:ext uri="{FF2B5EF4-FFF2-40B4-BE49-F238E27FC236}">
-                <a16:creationId xmlns:a16="http://schemas.microsoft.com/office/drawing/2014/main" id="{ABC2CBD0-38EF-4DA2-91D7-23B187B958C4}"/>
-              </a:ext>
-            </a:extLst>
-          </p:cNvPr>
-          <p:cNvSpPr txBox="1"/>
-          <p:nvPr/>
-        </p:nvSpPr>
-        <p:spPr>
-          <a:xfrm>
-            <a:off x="6562532" y="1124578"/>
-            <a:ext cx="1026367" cy="954107"/>
-          </a:xfrm>
-          <a:prstGeom prst="rect">
-            <a:avLst/>
-          </a:prstGeom>
-          <a:noFill/>
-        </p:spPr>
-        <p:txBody>
-          <a:bodyPr wrap="square" rtlCol="0">
-            <a:spAutoFit/>
-          </a:bodyPr>
-          <a:lstStyle/>
-          <a:p>
-            <a:pPr algn="ctr"/>
-            <a:r>
-              <a:rPr lang="en-US" sz="1400" b="1" dirty="0"/>
-              <a:t>NN</a:t>
-            </a:r>
-          </a:p>
-          <a:p>
-            <a:pPr algn="ctr"/>
-            <a:r>
-              <a:rPr lang="en-US" sz="1400" dirty="0"/>
-              <a:t>Is this rectangle a car plate?</a:t>
-            </a:r>
-          </a:p>
-        </p:txBody>
-      </p:sp>
-      <p:sp>
-        <p:nvSpPr>
-          <p:cNvPr id="25" name="Rectangle 24">
-            <a:extLst>
-              <a:ext uri="{FF2B5EF4-FFF2-40B4-BE49-F238E27FC236}">
-                <a16:creationId xmlns:a16="http://schemas.microsoft.com/office/drawing/2014/main" id="{A37F9546-2095-46F4-8458-2681068754FA}"/>
-              </a:ext>
-            </a:extLst>
-          </p:cNvPr>
-          <p:cNvSpPr/>
-          <p:nvPr/>
-        </p:nvSpPr>
-        <p:spPr>
-          <a:xfrm>
-            <a:off x="10126829" y="4666096"/>
-            <a:ext cx="1138334" cy="954107"/>
-          </a:xfrm>
-          <a:prstGeom prst="rect">
-            <a:avLst/>
-          </a:prstGeom>
-        </p:spPr>
-        <p:style>
-          <a:lnRef idx="1">
-            <a:schemeClr val="accent4"/>
-          </a:lnRef>
-          <a:fillRef idx="2">
-            <a:schemeClr val="accent4"/>
-          </a:fillRef>
-          <a:effectRef idx="1">
-            <a:schemeClr val="accent4"/>
-          </a:effectRef>
-          <a:fontRef idx="minor">
-            <a:schemeClr val="dk1"/>
-          </a:fontRef>
-        </p:style>
-        <p:txBody>
-          <a:bodyPr rtlCol="0" anchor="ctr"/>
-          <a:lstStyle/>
-          <a:p>
-            <a:pPr algn="ctr"/>
-            <a:endParaRPr lang="en-US" dirty="0"/>
-          </a:p>
-        </p:txBody>
-      </p:sp>
-      <p:sp>
-        <p:nvSpPr>
-          <p:cNvPr id="26" name="TextBox 25">
-            <a:extLst>
-              <a:ext uri="{FF2B5EF4-FFF2-40B4-BE49-F238E27FC236}">
-                <a16:creationId xmlns:a16="http://schemas.microsoft.com/office/drawing/2014/main" id="{B3068B79-50A4-441B-B460-539FC9151825}"/>
-              </a:ext>
-            </a:extLst>
-          </p:cNvPr>
-          <p:cNvSpPr txBox="1"/>
-          <p:nvPr/>
-        </p:nvSpPr>
-        <p:spPr>
-          <a:xfrm>
-            <a:off x="10154819" y="4666096"/>
-            <a:ext cx="1082351" cy="954107"/>
-          </a:xfrm>
-          <a:prstGeom prst="rect">
-            <a:avLst/>
-          </a:prstGeom>
-          <a:noFill/>
-        </p:spPr>
-        <p:txBody>
-          <a:bodyPr wrap="square" rtlCol="0">
-            <a:spAutoFit/>
-          </a:bodyPr>
-          <a:lstStyle/>
-          <a:p>
-            <a:pPr algn="ctr"/>
-            <a:r>
-              <a:rPr lang="en-US" sz="1400" b="1" dirty="0"/>
-              <a:t>NN</a:t>
-            </a:r>
-          </a:p>
-          <a:p>
-            <a:pPr algn="ctr"/>
-            <a:r>
-              <a:rPr lang="en-US" sz="1400" dirty="0"/>
-              <a:t>Which </a:t>
-            </a:r>
-            <a:r>
-              <a:rPr lang="en-US" altLang="zh-CN" sz="1400" dirty="0"/>
-              <a:t>S</a:t>
-            </a:r>
-            <a:r>
-              <a:rPr lang="en-US" sz="1400" dirty="0"/>
-              <a:t>tate is this plate from ?</a:t>
-            </a:r>
-          </a:p>
-        </p:txBody>
-      </p:sp>
-      <p:sp>
-        <p:nvSpPr>
-          <p:cNvPr id="28" name="TextBox 27">
-            <a:extLst>
-              <a:ext uri="{FF2B5EF4-FFF2-40B4-BE49-F238E27FC236}">
-                <a16:creationId xmlns:a16="http://schemas.microsoft.com/office/drawing/2014/main" id="{ABD99FE6-0FCE-44FD-9D78-73F2702B9899}"/>
-              </a:ext>
-            </a:extLst>
-          </p:cNvPr>
-          <p:cNvSpPr txBox="1"/>
-          <p:nvPr/>
-        </p:nvSpPr>
-        <p:spPr>
-          <a:xfrm>
-            <a:off x="9996141" y="2443373"/>
-            <a:ext cx="1380930" cy="738664"/>
-          </a:xfrm>
-          <a:prstGeom prst="rect">
-            <a:avLst/>
-          </a:prstGeom>
-          <a:noFill/>
-        </p:spPr>
-        <p:txBody>
-          <a:bodyPr wrap="square" rtlCol="0">
-            <a:spAutoFit/>
-          </a:bodyPr>
-          <a:lstStyle/>
-          <a:p>
-            <a:pPr algn="ctr"/>
-            <a:r>
-              <a:rPr lang="en-US" sz="1400" b="1" dirty="0"/>
-              <a:t>- Grayscale</a:t>
-            </a:r>
-          </a:p>
-          <a:p>
-            <a:pPr algn="ctr"/>
-            <a:r>
-              <a:rPr lang="en-US" altLang="zh-CN" sz="1400" b="1" dirty="0"/>
-              <a:t>- Edge detection - </a:t>
-            </a:r>
-            <a:r>
-              <a:rPr lang="en-US" sz="1400" b="1" dirty="0"/>
-              <a:t>Binarization</a:t>
-            </a:r>
-          </a:p>
-        </p:txBody>
-      </p:sp>
-      <p:sp>
-        <p:nvSpPr>
-          <p:cNvPr id="31" name="TextBox 30">
-            <a:extLst>
-              <a:ext uri="{FF2B5EF4-FFF2-40B4-BE49-F238E27FC236}">
-                <a16:creationId xmlns:a16="http://schemas.microsoft.com/office/drawing/2014/main" id="{19ED3009-029E-4EDE-9CAC-1AAD8930BDA5}"/>
-              </a:ext>
-            </a:extLst>
-          </p:cNvPr>
-          <p:cNvSpPr txBox="1"/>
-          <p:nvPr/>
-        </p:nvSpPr>
-        <p:spPr>
-          <a:xfrm>
-            <a:off x="8375781" y="3633793"/>
-            <a:ext cx="934190" cy="523220"/>
-          </a:xfrm>
-          <a:prstGeom prst="rect">
-            <a:avLst/>
-          </a:prstGeom>
-          <a:noFill/>
-        </p:spPr>
-        <p:txBody>
-          <a:bodyPr wrap="square" rtlCol="0">
-            <a:spAutoFit/>
-          </a:bodyPr>
-          <a:lstStyle/>
-          <a:p>
-            <a:pPr algn="ctr"/>
-            <a:r>
-              <a:rPr lang="en-US" sz="1400" b="1" dirty="0"/>
-              <a:t>Sequence  extraction</a:t>
-            </a:r>
-          </a:p>
-        </p:txBody>
-      </p:sp>
-      <p:sp>
-        <p:nvSpPr>
-          <p:cNvPr id="33" name="Rectangle 32">
-            <a:extLst>
-              <a:ext uri="{FF2B5EF4-FFF2-40B4-BE49-F238E27FC236}">
-                <a16:creationId xmlns:a16="http://schemas.microsoft.com/office/drawing/2014/main" id="{42C1E835-85BE-471F-AC6B-D78C645294D6}"/>
-              </a:ext>
-            </a:extLst>
-          </p:cNvPr>
-          <p:cNvSpPr/>
-          <p:nvPr/>
-        </p:nvSpPr>
-        <p:spPr>
-          <a:xfrm>
-            <a:off x="8254483" y="4913661"/>
-            <a:ext cx="1138334" cy="578573"/>
-          </a:xfrm>
-          <a:prstGeom prst="rect">
-            <a:avLst/>
-          </a:prstGeom>
-          <a:solidFill>
-            <a:schemeClr val="accent5">
-              <a:lumMod val="20000"/>
-              <a:lumOff val="80000"/>
-            </a:schemeClr>
-          </a:solidFill>
-        </p:spPr>
-        <p:style>
-          <a:lnRef idx="1">
-            <a:schemeClr val="accent5"/>
-          </a:lnRef>
-          <a:fillRef idx="2">
-            <a:schemeClr val="accent5"/>
-          </a:fillRef>
-          <a:effectRef idx="1">
-            <a:schemeClr val="accent5"/>
-          </a:effectRef>
-          <a:fontRef idx="minor">
-            <a:schemeClr val="dk1"/>
-          </a:fontRef>
-        </p:style>
-        <p:txBody>
-          <a:bodyPr rtlCol="0" anchor="ctr"/>
-          <a:lstStyle/>
-          <a:p>
-            <a:pPr algn="ctr"/>
-            <a:endParaRPr lang="en-US" dirty="0"/>
-          </a:p>
-        </p:txBody>
-      </p:sp>
-      <p:sp>
-        <p:nvSpPr>
-          <p:cNvPr id="34" name="TextBox 33">
-            <a:extLst>
-              <a:ext uri="{FF2B5EF4-FFF2-40B4-BE49-F238E27FC236}">
-                <a16:creationId xmlns:a16="http://schemas.microsoft.com/office/drawing/2014/main" id="{42485960-001A-48FE-AB1C-E1C52514C822}"/>
-              </a:ext>
-            </a:extLst>
-          </p:cNvPr>
-          <p:cNvSpPr txBox="1"/>
-          <p:nvPr/>
-        </p:nvSpPr>
-        <p:spPr>
-          <a:xfrm>
-            <a:off x="8375781" y="4964200"/>
-            <a:ext cx="923730" cy="523220"/>
-          </a:xfrm>
-          <a:prstGeom prst="rect">
-            <a:avLst/>
-          </a:prstGeom>
-          <a:noFill/>
-        </p:spPr>
-        <p:txBody>
-          <a:bodyPr wrap="square" rtlCol="0">
-            <a:spAutoFit/>
-          </a:bodyPr>
-          <a:lstStyle/>
-          <a:p>
-            <a:pPr algn="ctr"/>
-            <a:r>
-              <a:rPr lang="en-US" sz="1400" b="1" dirty="0"/>
-              <a:t>RGB/HSV Info</a:t>
-            </a:r>
-          </a:p>
-        </p:txBody>
-      </p:sp>
-      <p:sp>
-        <p:nvSpPr>
-          <p:cNvPr id="35" name="TextBox 34">
-            <a:extLst>
-              <a:ext uri="{FF2B5EF4-FFF2-40B4-BE49-F238E27FC236}">
-                <a16:creationId xmlns:a16="http://schemas.microsoft.com/office/drawing/2014/main" id="{1B6C4763-84C1-4E5F-A2FF-49E4530DF81A}"/>
-              </a:ext>
-            </a:extLst>
-          </p:cNvPr>
-          <p:cNvSpPr txBox="1"/>
-          <p:nvPr/>
-        </p:nvSpPr>
-        <p:spPr>
-          <a:xfrm>
-            <a:off x="9434030" y="4935666"/>
-            <a:ext cx="594048" cy="307777"/>
-          </a:xfrm>
-          <a:prstGeom prst="rect">
-            <a:avLst/>
-          </a:prstGeom>
-          <a:noFill/>
-        </p:spPr>
-        <p:txBody>
-          <a:bodyPr wrap="square" rtlCol="0">
-            <a:spAutoFit/>
-          </a:bodyPr>
-          <a:lstStyle/>
-          <a:p>
-            <a:pPr algn="ctr"/>
-            <a:r>
-              <a:rPr lang="en-US" sz="1400" dirty="0"/>
-              <a:t>MA</a:t>
-            </a:r>
-          </a:p>
-        </p:txBody>
-      </p:sp>
-      <p:sp>
-        <p:nvSpPr>
-          <p:cNvPr id="48" name="Rectangle 47">
-            <a:extLst>
-              <a:ext uri="{FF2B5EF4-FFF2-40B4-BE49-F238E27FC236}">
-                <a16:creationId xmlns:a16="http://schemas.microsoft.com/office/drawing/2014/main" id="{BEFD1B86-7270-43E9-81C4-752421354422}"/>
-              </a:ext>
-            </a:extLst>
-          </p:cNvPr>
-          <p:cNvSpPr/>
-          <p:nvPr/>
-        </p:nvSpPr>
-        <p:spPr>
-          <a:xfrm>
-            <a:off x="4837710" y="3606116"/>
-            <a:ext cx="1420721" cy="578573"/>
-          </a:xfrm>
-          <a:prstGeom prst="rect">
-            <a:avLst/>
-          </a:prstGeom>
-          <a:solidFill>
-            <a:schemeClr val="accent5">
-              <a:lumMod val="20000"/>
-              <a:lumOff val="80000"/>
-            </a:schemeClr>
-          </a:solidFill>
-        </p:spPr>
-        <p:style>
-          <a:lnRef idx="1">
-            <a:schemeClr val="accent5"/>
-          </a:lnRef>
-          <a:fillRef idx="2">
-            <a:schemeClr val="accent5"/>
-          </a:fillRef>
-          <a:effectRef idx="1">
-            <a:schemeClr val="accent5"/>
-          </a:effectRef>
-          <a:fontRef idx="minor">
-            <a:schemeClr val="dk1"/>
-          </a:fontRef>
-        </p:style>
-        <p:txBody>
-          <a:bodyPr rtlCol="0" anchor="ctr"/>
-          <a:lstStyle/>
-          <a:p>
-            <a:pPr algn="ctr"/>
-            <a:endParaRPr lang="en-US" dirty="0"/>
-          </a:p>
-        </p:txBody>
-      </p:sp>
-      <p:sp>
-        <p:nvSpPr>
-          <p:cNvPr id="49" name="TextBox 48">
-            <a:extLst>
-              <a:ext uri="{FF2B5EF4-FFF2-40B4-BE49-F238E27FC236}">
-                <a16:creationId xmlns:a16="http://schemas.microsoft.com/office/drawing/2014/main" id="{7C8C3206-CBC5-4577-984C-E6E5571B6FAD}"/>
-              </a:ext>
-            </a:extLst>
-          </p:cNvPr>
-          <p:cNvSpPr txBox="1"/>
-          <p:nvPr/>
-        </p:nvSpPr>
-        <p:spPr>
-          <a:xfrm>
-            <a:off x="4936885" y="3633792"/>
-            <a:ext cx="1222369" cy="523220"/>
-          </a:xfrm>
-          <a:prstGeom prst="rect">
-            <a:avLst/>
-          </a:prstGeom>
-          <a:noFill/>
-        </p:spPr>
-        <p:txBody>
-          <a:bodyPr wrap="square" rtlCol="0">
-            <a:spAutoFit/>
-          </a:bodyPr>
-          <a:lstStyle/>
-          <a:p>
-            <a:pPr algn="ctr"/>
-            <a:r>
-              <a:rPr lang="en-US" sz="1400" b="1" dirty="0"/>
-              <a:t>Character segmentation</a:t>
-            </a:r>
-          </a:p>
-        </p:txBody>
-      </p:sp>
-      <p:pic>
-        <p:nvPicPr>
-          <p:cNvPr id="51" name="Picture 50">
-            <a:extLst>
-              <a:ext uri="{FF2B5EF4-FFF2-40B4-BE49-F238E27FC236}">
-                <a16:creationId xmlns:a16="http://schemas.microsoft.com/office/drawing/2014/main" id="{9CD713D4-58E1-4E7B-B161-B105EF38B417}"/>
-              </a:ext>
-            </a:extLst>
-          </p:cNvPr>
-          <p:cNvPicPr>
-            <a:picLocks noChangeAspect="1"/>
-          </p:cNvPicPr>
-          <p:nvPr/>
-        </p:nvPicPr>
-        <p:blipFill>
-          <a:blip r:embed="rId6"/>
-          <a:stretch>
-            <a:fillRect/>
-          </a:stretch>
-        </p:blipFill>
-        <p:spPr>
-          <a:xfrm>
-            <a:off x="3969498" y="2878541"/>
-            <a:ext cx="242670" cy="2035120"/>
-          </a:xfrm>
-          <a:prstGeom prst="rect">
-            <a:avLst/>
-          </a:prstGeom>
-        </p:spPr>
-      </p:pic>
-      <p:sp>
-        <p:nvSpPr>
-          <p:cNvPr id="54" name="Rectangle 53">
-            <a:extLst>
-              <a:ext uri="{FF2B5EF4-FFF2-40B4-BE49-F238E27FC236}">
-                <a16:creationId xmlns:a16="http://schemas.microsoft.com/office/drawing/2014/main" id="{619D30DE-31FA-41CB-BCB7-00F9B6973364}"/>
-              </a:ext>
-            </a:extLst>
-          </p:cNvPr>
-          <p:cNvSpPr/>
-          <p:nvPr/>
-        </p:nvSpPr>
-        <p:spPr>
-          <a:xfrm>
-            <a:off x="2452094" y="3400920"/>
-            <a:ext cx="1138334" cy="954107"/>
-          </a:xfrm>
-          <a:prstGeom prst="rect">
-            <a:avLst/>
-          </a:prstGeom>
-        </p:spPr>
-        <p:style>
-          <a:lnRef idx="1">
-            <a:schemeClr val="accent4"/>
-          </a:lnRef>
-          <a:fillRef idx="2">
-            <a:schemeClr val="accent4"/>
-          </a:fillRef>
-          <a:effectRef idx="1">
-            <a:schemeClr val="accent4"/>
-          </a:effectRef>
-          <a:fontRef idx="minor">
-            <a:schemeClr val="dk1"/>
-          </a:fontRef>
-        </p:style>
-        <p:txBody>
-          <a:bodyPr rtlCol="0" anchor="ctr"/>
-          <a:lstStyle/>
-          <a:p>
-            <a:pPr algn="ctr"/>
-            <a:endParaRPr lang="en-US" dirty="0"/>
-          </a:p>
-        </p:txBody>
-      </p:sp>
-      <p:sp>
-        <p:nvSpPr>
-          <p:cNvPr id="55" name="TextBox 54">
-            <a:extLst>
-              <a:ext uri="{FF2B5EF4-FFF2-40B4-BE49-F238E27FC236}">
-                <a16:creationId xmlns:a16="http://schemas.microsoft.com/office/drawing/2014/main" id="{404D3BE0-5F6A-4DE0-B87E-6DEEB53DCDE6}"/>
-              </a:ext>
-            </a:extLst>
-          </p:cNvPr>
-          <p:cNvSpPr txBox="1"/>
-          <p:nvPr/>
-        </p:nvSpPr>
-        <p:spPr>
-          <a:xfrm>
-            <a:off x="2490216" y="3497486"/>
-            <a:ext cx="1026367" cy="738664"/>
-          </a:xfrm>
-          <a:prstGeom prst="rect">
-            <a:avLst/>
-          </a:prstGeom>
-          <a:noFill/>
-        </p:spPr>
-        <p:txBody>
-          <a:bodyPr wrap="square" rtlCol="0">
-            <a:spAutoFit/>
-          </a:bodyPr>
-          <a:lstStyle/>
-          <a:p>
-            <a:pPr algn="ctr"/>
-            <a:r>
-              <a:rPr lang="en-US" sz="1400" b="1" dirty="0"/>
-              <a:t>NN</a:t>
-            </a:r>
-          </a:p>
-          <a:p>
-            <a:pPr algn="ctr"/>
-            <a:r>
-              <a:rPr lang="en-US" sz="1400" dirty="0"/>
-              <a:t>Character </a:t>
-            </a:r>
-            <a:r>
-              <a:rPr lang="en-US" altLang="zh-CN" sz="1400" dirty="0"/>
-              <a:t>recognition</a:t>
-            </a:r>
-            <a:endParaRPr lang="en-US" sz="1400" dirty="0"/>
-          </a:p>
-        </p:txBody>
-      </p:sp>
-      <p:sp>
-        <p:nvSpPr>
-          <p:cNvPr id="56" name="TextBox 55">
-            <a:extLst>
-              <a:ext uri="{FF2B5EF4-FFF2-40B4-BE49-F238E27FC236}">
-                <a16:creationId xmlns:a16="http://schemas.microsoft.com/office/drawing/2014/main" id="{401C68DE-FA0B-4630-8E25-F1F67B6EE692}"/>
-              </a:ext>
-            </a:extLst>
-          </p:cNvPr>
-          <p:cNvSpPr txBox="1"/>
-          <p:nvPr/>
-        </p:nvSpPr>
-        <p:spPr>
-          <a:xfrm>
-            <a:off x="805706" y="3700128"/>
-            <a:ext cx="1167690" cy="369332"/>
-          </a:xfrm>
-          <a:prstGeom prst="rect">
-            <a:avLst/>
-          </a:prstGeom>
-          <a:noFill/>
-        </p:spPr>
-        <p:txBody>
-          <a:bodyPr wrap="square" rtlCol="0">
-            <a:spAutoFit/>
-          </a:bodyPr>
-          <a:lstStyle/>
-          <a:p>
-            <a:pPr algn="ctr"/>
-            <a:r>
-              <a:rPr lang="en-US" b="1" dirty="0"/>
-              <a:t>1 H J F 6 4</a:t>
-            </a:r>
-          </a:p>
-        </p:txBody>
-      </p:sp>
-      <p:sp>
-        <p:nvSpPr>
-          <p:cNvPr id="60" name="Arrow: Right 59">
-            <a:extLst>
-              <a:ext uri="{FF2B5EF4-FFF2-40B4-BE49-F238E27FC236}">
-                <a16:creationId xmlns:a16="http://schemas.microsoft.com/office/drawing/2014/main" id="{F3BF1157-B1EE-4CF2-B324-2F4C37FDB307}"/>
-              </a:ext>
-            </a:extLst>
-          </p:cNvPr>
-          <p:cNvSpPr/>
-          <p:nvPr/>
-        </p:nvSpPr>
-        <p:spPr>
-          <a:xfrm rot="5400000">
-            <a:off x="8041835" y="2641180"/>
-            <a:ext cx="1455177" cy="291919"/>
-          </a:xfrm>
-          <a:prstGeom prst="rightArrow">
-            <a:avLst/>
-          </a:prstGeom>
-        </p:spPr>
-        <p:style>
-          <a:lnRef idx="1">
-            <a:schemeClr val="accent3"/>
-          </a:lnRef>
-          <a:fillRef idx="2">
-            <a:schemeClr val="accent3"/>
-          </a:fillRef>
-          <a:effectRef idx="1">
-            <a:schemeClr val="accent3"/>
-          </a:effectRef>
-          <a:fontRef idx="minor">
-            <a:schemeClr val="dk1"/>
-          </a:fontRef>
-        </p:style>
-        <p:txBody>
-          <a:bodyPr rtlCol="0" anchor="ctr"/>
-          <a:lstStyle/>
-          <a:p>
-            <a:pPr algn="ctr"/>
-            <a:endParaRPr lang="en-US"/>
-          </a:p>
-        </p:txBody>
-      </p:sp>
-      <p:sp>
-        <p:nvSpPr>
-          <p:cNvPr id="61" name="Arrow: Right 60">
-            <a:extLst>
-              <a:ext uri="{FF2B5EF4-FFF2-40B4-BE49-F238E27FC236}">
-                <a16:creationId xmlns:a16="http://schemas.microsoft.com/office/drawing/2014/main" id="{6640F5E4-1E28-47B0-A1F4-B005C851750F}"/>
-              </a:ext>
-            </a:extLst>
-          </p:cNvPr>
-          <p:cNvSpPr/>
-          <p:nvPr/>
-        </p:nvSpPr>
-        <p:spPr>
-          <a:xfrm rot="16200000">
-            <a:off x="8506303" y="4348085"/>
-            <a:ext cx="578572" cy="291919"/>
-          </a:xfrm>
-          <a:prstGeom prst="rightArrow">
-            <a:avLst/>
-          </a:prstGeom>
-        </p:spPr>
-        <p:style>
-          <a:lnRef idx="1">
-            <a:schemeClr val="accent3"/>
-          </a:lnRef>
-          <a:fillRef idx="2">
-            <a:schemeClr val="accent3"/>
-          </a:fillRef>
-          <a:effectRef idx="1">
-            <a:schemeClr val="accent3"/>
-          </a:effectRef>
-          <a:fontRef idx="minor">
-            <a:schemeClr val="dk1"/>
-          </a:fontRef>
-        </p:style>
-        <p:txBody>
-          <a:bodyPr rtlCol="0" anchor="ctr"/>
-          <a:lstStyle/>
-          <a:p>
-            <a:pPr algn="ctr"/>
-            <a:endParaRPr lang="en-US"/>
-          </a:p>
-        </p:txBody>
-      </p:sp>
+        </p:grpSpPr>
+        <p:sp>
+          <p:nvSpPr>
+            <p:cNvPr id="67" name="Arrow: Right 66">
+              <a:extLst>
+                <a:ext uri="{FF2B5EF4-FFF2-40B4-BE49-F238E27FC236}">
+                  <a16:creationId xmlns:a16="http://schemas.microsoft.com/office/drawing/2014/main" id="{14A2CE88-3057-4278-AE7A-8F7FD228915D}"/>
+                </a:ext>
+              </a:extLst>
+            </p:cNvPr>
+            <p:cNvSpPr/>
+            <p:nvPr/>
+          </p:nvSpPr>
+          <p:spPr>
+            <a:xfrm>
+              <a:off x="6117514" y="1523192"/>
+              <a:ext cx="1963524" cy="291919"/>
+            </a:xfrm>
+            <a:prstGeom prst="rightArrow">
+              <a:avLst/>
+            </a:prstGeom>
+          </p:spPr>
+          <p:style>
+            <a:lnRef idx="1">
+              <a:schemeClr val="accent3"/>
+            </a:lnRef>
+            <a:fillRef idx="2">
+              <a:schemeClr val="accent3"/>
+            </a:fillRef>
+            <a:effectRef idx="1">
+              <a:schemeClr val="accent3"/>
+            </a:effectRef>
+            <a:fontRef idx="minor">
+              <a:schemeClr val="dk1"/>
+            </a:fontRef>
+          </p:style>
+          <p:txBody>
+            <a:bodyPr rtlCol="0" anchor="ctr"/>
+            <a:lstStyle/>
+            <a:p>
+              <a:pPr algn="ctr"/>
+              <a:endParaRPr lang="en-US"/>
+            </a:p>
+          </p:txBody>
+        </p:sp>
+        <p:sp>
+          <p:nvSpPr>
+            <p:cNvPr id="63" name="Arrow: Right 62">
+              <a:extLst>
+                <a:ext uri="{FF2B5EF4-FFF2-40B4-BE49-F238E27FC236}">
+                  <a16:creationId xmlns:a16="http://schemas.microsoft.com/office/drawing/2014/main" id="{62171E70-FA2B-4032-B421-30D334C53178}"/>
+                </a:ext>
+              </a:extLst>
+            </p:cNvPr>
+            <p:cNvSpPr/>
+            <p:nvPr/>
+          </p:nvSpPr>
+          <p:spPr>
+            <a:xfrm rot="10800000">
+              <a:off x="9406035" y="5132855"/>
+              <a:ext cx="1138333" cy="291919"/>
+            </a:xfrm>
+            <a:prstGeom prst="rightArrow">
+              <a:avLst/>
+            </a:prstGeom>
+          </p:spPr>
+          <p:style>
+            <a:lnRef idx="1">
+              <a:schemeClr val="accent3"/>
+            </a:lnRef>
+            <a:fillRef idx="2">
+              <a:schemeClr val="accent3"/>
+            </a:fillRef>
+            <a:effectRef idx="1">
+              <a:schemeClr val="accent3"/>
+            </a:effectRef>
+            <a:fontRef idx="minor">
+              <a:schemeClr val="dk1"/>
+            </a:fontRef>
+          </p:style>
+          <p:txBody>
+            <a:bodyPr rtlCol="0" anchor="ctr"/>
+            <a:lstStyle/>
+            <a:p>
+              <a:pPr algn="ctr"/>
+              <a:endParaRPr lang="en-US"/>
+            </a:p>
+          </p:txBody>
+        </p:sp>
+        <p:sp>
+          <p:nvSpPr>
+            <p:cNvPr id="66" name="Arrow: Right 65">
+              <a:extLst>
+                <a:ext uri="{FF2B5EF4-FFF2-40B4-BE49-F238E27FC236}">
+                  <a16:creationId xmlns:a16="http://schemas.microsoft.com/office/drawing/2014/main" id="{CC10F384-9969-44E8-823C-94C0B4D5CBF4}"/>
+                </a:ext>
+              </a:extLst>
+            </p:cNvPr>
+            <p:cNvSpPr/>
+            <p:nvPr/>
+          </p:nvSpPr>
+          <p:spPr>
+            <a:xfrm rot="5400000">
+              <a:off x="10007942" y="4617917"/>
+              <a:ext cx="1321798" cy="291919"/>
+            </a:xfrm>
+            <a:prstGeom prst="rightArrow">
+              <a:avLst/>
+            </a:prstGeom>
+          </p:spPr>
+          <p:style>
+            <a:lnRef idx="1">
+              <a:schemeClr val="accent3"/>
+            </a:lnRef>
+            <a:fillRef idx="2">
+              <a:schemeClr val="accent3"/>
+            </a:fillRef>
+            <a:effectRef idx="1">
+              <a:schemeClr val="accent3"/>
+            </a:effectRef>
+            <a:fontRef idx="minor">
+              <a:schemeClr val="dk1"/>
+            </a:fontRef>
+          </p:style>
+          <p:txBody>
+            <a:bodyPr rtlCol="0" anchor="ctr"/>
+            <a:lstStyle/>
+            <a:p>
+              <a:pPr algn="ctr"/>
+              <a:endParaRPr lang="en-US"/>
+            </a:p>
+          </p:txBody>
+        </p:sp>
+        <p:sp>
+          <p:nvSpPr>
+            <p:cNvPr id="64" name="Arrow: Right 63">
+              <a:extLst>
+                <a:ext uri="{FF2B5EF4-FFF2-40B4-BE49-F238E27FC236}">
+                  <a16:creationId xmlns:a16="http://schemas.microsoft.com/office/drawing/2014/main" id="{D8DC8146-A9F8-41EB-94EC-C68EDC8450D5}"/>
+                </a:ext>
+              </a:extLst>
+            </p:cNvPr>
+            <p:cNvSpPr/>
+            <p:nvPr/>
+          </p:nvSpPr>
+          <p:spPr>
+            <a:xfrm rot="10800000">
+              <a:off x="1964101" y="3759002"/>
+              <a:ext cx="1968109" cy="291919"/>
+            </a:xfrm>
+            <a:prstGeom prst="rightArrow">
+              <a:avLst/>
+            </a:prstGeom>
+          </p:spPr>
+          <p:style>
+            <a:lnRef idx="1">
+              <a:schemeClr val="accent3"/>
+            </a:lnRef>
+            <a:fillRef idx="2">
+              <a:schemeClr val="accent3"/>
+            </a:fillRef>
+            <a:effectRef idx="1">
+              <a:schemeClr val="accent3"/>
+            </a:effectRef>
+            <a:fontRef idx="minor">
+              <a:schemeClr val="dk1"/>
+            </a:fontRef>
+          </p:style>
+          <p:txBody>
+            <a:bodyPr rtlCol="0" anchor="ctr"/>
+            <a:lstStyle/>
+            <a:p>
+              <a:pPr algn="ctr"/>
+              <a:endParaRPr lang="en-US"/>
+            </a:p>
+          </p:txBody>
+        </p:sp>
+        <p:sp>
+          <p:nvSpPr>
+            <p:cNvPr id="62" name="Arrow: Right 61">
+              <a:extLst>
+                <a:ext uri="{FF2B5EF4-FFF2-40B4-BE49-F238E27FC236}">
+                  <a16:creationId xmlns:a16="http://schemas.microsoft.com/office/drawing/2014/main" id="{E3736C6F-3788-4C38-8AA9-743E0A12701B}"/>
+                </a:ext>
+              </a:extLst>
+            </p:cNvPr>
+            <p:cNvSpPr/>
+            <p:nvPr/>
+          </p:nvSpPr>
+          <p:spPr>
+            <a:xfrm rot="10800000">
+              <a:off x="4249455" y="3760647"/>
+              <a:ext cx="3930451" cy="291919"/>
+            </a:xfrm>
+            <a:prstGeom prst="rightArrow">
+              <a:avLst/>
+            </a:prstGeom>
+          </p:spPr>
+          <p:style>
+            <a:lnRef idx="1">
+              <a:schemeClr val="accent3"/>
+            </a:lnRef>
+            <a:fillRef idx="2">
+              <a:schemeClr val="accent3"/>
+            </a:fillRef>
+            <a:effectRef idx="1">
+              <a:schemeClr val="accent3"/>
+            </a:effectRef>
+            <a:fontRef idx="minor">
+              <a:schemeClr val="dk1"/>
+            </a:fontRef>
+          </p:style>
+          <p:txBody>
+            <a:bodyPr rtlCol="0" anchor="ctr"/>
+            <a:lstStyle/>
+            <a:p>
+              <a:pPr algn="ctr"/>
+              <a:endParaRPr lang="en-US"/>
+            </a:p>
+          </p:txBody>
+        </p:sp>
+        <p:sp>
+          <p:nvSpPr>
+            <p:cNvPr id="59" name="Arrow: Right 58">
+              <a:extLst>
+                <a:ext uri="{FF2B5EF4-FFF2-40B4-BE49-F238E27FC236}">
+                  <a16:creationId xmlns:a16="http://schemas.microsoft.com/office/drawing/2014/main" id="{2A709EBA-E819-4646-BF92-418F85CD1925}"/>
+                </a:ext>
+              </a:extLst>
+            </p:cNvPr>
+            <p:cNvSpPr/>
+            <p:nvPr/>
+          </p:nvSpPr>
+          <p:spPr>
+            <a:xfrm rot="5400000">
+              <a:off x="9734875" y="2608441"/>
+              <a:ext cx="1878575" cy="291919"/>
+            </a:xfrm>
+            <a:prstGeom prst="rightArrow">
+              <a:avLst/>
+            </a:prstGeom>
+          </p:spPr>
+          <p:style>
+            <a:lnRef idx="1">
+              <a:schemeClr val="accent3"/>
+            </a:lnRef>
+            <a:fillRef idx="2">
+              <a:schemeClr val="accent3"/>
+            </a:fillRef>
+            <a:effectRef idx="1">
+              <a:schemeClr val="accent3"/>
+            </a:effectRef>
+            <a:fontRef idx="minor">
+              <a:schemeClr val="dk1"/>
+            </a:fontRef>
+          </p:style>
+          <p:txBody>
+            <a:bodyPr rtlCol="0" anchor="ctr"/>
+            <a:lstStyle/>
+            <a:p>
+              <a:pPr algn="ctr"/>
+              <a:endParaRPr lang="en-US"/>
+            </a:p>
+          </p:txBody>
+        </p:sp>
+        <p:sp>
+          <p:nvSpPr>
+            <p:cNvPr id="58" name="Arrow: Right 57">
+              <a:extLst>
+                <a:ext uri="{FF2B5EF4-FFF2-40B4-BE49-F238E27FC236}">
+                  <a16:creationId xmlns:a16="http://schemas.microsoft.com/office/drawing/2014/main" id="{7C571D39-F928-4777-9F14-CCF9112F8985}"/>
+                </a:ext>
+              </a:extLst>
+            </p:cNvPr>
+            <p:cNvSpPr/>
+            <p:nvPr/>
+          </p:nvSpPr>
+          <p:spPr>
+            <a:xfrm>
+              <a:off x="9479168" y="1523192"/>
+              <a:ext cx="809387" cy="291919"/>
+            </a:xfrm>
+            <a:prstGeom prst="rightArrow">
+              <a:avLst/>
+            </a:prstGeom>
+          </p:spPr>
+          <p:style>
+            <a:lnRef idx="1">
+              <a:schemeClr val="accent3"/>
+            </a:lnRef>
+            <a:fillRef idx="2">
+              <a:schemeClr val="accent3"/>
+            </a:fillRef>
+            <a:effectRef idx="1">
+              <a:schemeClr val="accent3"/>
+            </a:effectRef>
+            <a:fontRef idx="minor">
+              <a:schemeClr val="dk1"/>
+            </a:fontRef>
+          </p:style>
+          <p:txBody>
+            <a:bodyPr rtlCol="0" anchor="ctr"/>
+            <a:lstStyle/>
+            <a:p>
+              <a:pPr algn="ctr"/>
+              <a:endParaRPr lang="en-US"/>
+            </a:p>
+          </p:txBody>
+        </p:sp>
+        <p:sp>
+          <p:nvSpPr>
+            <p:cNvPr id="57" name="Arrow: Right 56">
+              <a:extLst>
+                <a:ext uri="{FF2B5EF4-FFF2-40B4-BE49-F238E27FC236}">
+                  <a16:creationId xmlns:a16="http://schemas.microsoft.com/office/drawing/2014/main" id="{370B115F-BC0E-4C7A-8F53-20EC2854AA74}"/>
+                </a:ext>
+              </a:extLst>
+            </p:cNvPr>
+            <p:cNvSpPr/>
+            <p:nvPr/>
+          </p:nvSpPr>
+          <p:spPr>
+            <a:xfrm>
+              <a:off x="2446181" y="1550869"/>
+              <a:ext cx="2400922" cy="291919"/>
+            </a:xfrm>
+            <a:prstGeom prst="rightArrow">
+              <a:avLst/>
+            </a:prstGeom>
+          </p:spPr>
+          <p:style>
+            <a:lnRef idx="1">
+              <a:schemeClr val="accent3"/>
+            </a:lnRef>
+            <a:fillRef idx="2">
+              <a:schemeClr val="accent3"/>
+            </a:fillRef>
+            <a:effectRef idx="1">
+              <a:schemeClr val="accent3"/>
+            </a:effectRef>
+            <a:fontRef idx="minor">
+              <a:schemeClr val="dk1"/>
+            </a:fontRef>
+          </p:style>
+          <p:txBody>
+            <a:bodyPr rtlCol="0" anchor="ctr"/>
+            <a:lstStyle/>
+            <a:p>
+              <a:pPr algn="ctr"/>
+              <a:endParaRPr lang="en-US"/>
+            </a:p>
+          </p:txBody>
+        </p:sp>
+        <p:sp>
+          <p:nvSpPr>
+            <p:cNvPr id="32" name="Rectangle 31">
+              <a:extLst>
+                <a:ext uri="{FF2B5EF4-FFF2-40B4-BE49-F238E27FC236}">
+                  <a16:creationId xmlns:a16="http://schemas.microsoft.com/office/drawing/2014/main" id="{440C3642-173E-49E7-A6D6-5341ED964659}"/>
+                </a:ext>
+              </a:extLst>
+            </p:cNvPr>
+            <p:cNvSpPr/>
+            <p:nvPr/>
+          </p:nvSpPr>
+          <p:spPr>
+            <a:xfrm>
+              <a:off x="8254483" y="3583254"/>
+              <a:ext cx="1138334" cy="578573"/>
+            </a:xfrm>
+            <a:prstGeom prst="rect">
+              <a:avLst/>
+            </a:prstGeom>
+            <a:solidFill>
+              <a:schemeClr val="accent5">
+                <a:lumMod val="20000"/>
+                <a:lumOff val="80000"/>
+              </a:schemeClr>
+            </a:solidFill>
+          </p:spPr>
+          <p:style>
+            <a:lnRef idx="1">
+              <a:schemeClr val="accent5"/>
+            </a:lnRef>
+            <a:fillRef idx="2">
+              <a:schemeClr val="accent5"/>
+            </a:fillRef>
+            <a:effectRef idx="1">
+              <a:schemeClr val="accent5"/>
+            </a:effectRef>
+            <a:fontRef idx="minor">
+              <a:schemeClr val="dk1"/>
+            </a:fontRef>
+          </p:style>
+          <p:txBody>
+            <a:bodyPr rtlCol="0" anchor="ctr"/>
+            <a:lstStyle/>
+            <a:p>
+              <a:pPr algn="ctr"/>
+              <a:endParaRPr lang="en-US" dirty="0"/>
+            </a:p>
+          </p:txBody>
+        </p:sp>
+        <p:sp>
+          <p:nvSpPr>
+            <p:cNvPr id="30" name="Rectangle 29">
+              <a:extLst>
+                <a:ext uri="{FF2B5EF4-FFF2-40B4-BE49-F238E27FC236}">
+                  <a16:creationId xmlns:a16="http://schemas.microsoft.com/office/drawing/2014/main" id="{8A1A1891-E63D-4231-B3B8-359932AC080A}"/>
+                </a:ext>
+              </a:extLst>
+            </p:cNvPr>
+            <p:cNvSpPr/>
+            <p:nvPr/>
+          </p:nvSpPr>
+          <p:spPr>
+            <a:xfrm>
+              <a:off x="9983699" y="2444423"/>
+              <a:ext cx="1380930" cy="686147"/>
+            </a:xfrm>
+            <a:prstGeom prst="rect">
+              <a:avLst/>
+            </a:prstGeom>
+            <a:solidFill>
+              <a:schemeClr val="accent5">
+                <a:lumMod val="20000"/>
+                <a:lumOff val="80000"/>
+              </a:schemeClr>
+            </a:solidFill>
+          </p:spPr>
+          <p:style>
+            <a:lnRef idx="1">
+              <a:schemeClr val="accent5"/>
+            </a:lnRef>
+            <a:fillRef idx="2">
+              <a:schemeClr val="accent5"/>
+            </a:fillRef>
+            <a:effectRef idx="1">
+              <a:schemeClr val="accent5"/>
+            </a:effectRef>
+            <a:fontRef idx="minor">
+              <a:schemeClr val="dk1"/>
+            </a:fontRef>
+          </p:style>
+          <p:txBody>
+            <a:bodyPr rtlCol="0" anchor="ctr"/>
+            <a:lstStyle/>
+            <a:p>
+              <a:pPr algn="ctr"/>
+              <a:endParaRPr lang="en-US" dirty="0"/>
+            </a:p>
+          </p:txBody>
+        </p:sp>
+        <p:sp>
+          <p:nvSpPr>
+            <p:cNvPr id="29" name="Rectangle 28">
+              <a:extLst>
+                <a:ext uri="{FF2B5EF4-FFF2-40B4-BE49-F238E27FC236}">
+                  <a16:creationId xmlns:a16="http://schemas.microsoft.com/office/drawing/2014/main" id="{FA9D537C-E120-4950-9C7B-5211949DDED5}"/>
+                </a:ext>
+              </a:extLst>
+            </p:cNvPr>
+            <p:cNvSpPr/>
+            <p:nvPr/>
+          </p:nvSpPr>
+          <p:spPr>
+            <a:xfrm>
+              <a:off x="9996141" y="1368659"/>
+              <a:ext cx="1368488" cy="578573"/>
+            </a:xfrm>
+            <a:prstGeom prst="rect">
+              <a:avLst/>
+            </a:prstGeom>
+            <a:solidFill>
+              <a:schemeClr val="accent5">
+                <a:lumMod val="20000"/>
+                <a:lumOff val="80000"/>
+              </a:schemeClr>
+            </a:solidFill>
+          </p:spPr>
+          <p:style>
+            <a:lnRef idx="1">
+              <a:schemeClr val="accent5"/>
+            </a:lnRef>
+            <a:fillRef idx="2">
+              <a:schemeClr val="accent5"/>
+            </a:fillRef>
+            <a:effectRef idx="1">
+              <a:schemeClr val="accent5"/>
+            </a:effectRef>
+            <a:fontRef idx="minor">
+              <a:schemeClr val="dk1"/>
+            </a:fontRef>
+          </p:style>
+          <p:txBody>
+            <a:bodyPr rtlCol="0" anchor="ctr"/>
+            <a:lstStyle/>
+            <a:p>
+              <a:pPr algn="ctr"/>
+              <a:endParaRPr lang="en-US" dirty="0"/>
+            </a:p>
+          </p:txBody>
+        </p:sp>
+        <p:sp>
+          <p:nvSpPr>
+            <p:cNvPr id="22" name="Rectangle 21">
+              <a:extLst>
+                <a:ext uri="{FF2B5EF4-FFF2-40B4-BE49-F238E27FC236}">
+                  <a16:creationId xmlns:a16="http://schemas.microsoft.com/office/drawing/2014/main" id="{98A0A358-CB3F-4100-AA2A-324DA0F08DE6}"/>
+                </a:ext>
+              </a:extLst>
+            </p:cNvPr>
+            <p:cNvSpPr/>
+            <p:nvPr/>
+          </p:nvSpPr>
+          <p:spPr>
+            <a:xfrm>
+              <a:off x="4889243" y="1396336"/>
+              <a:ext cx="1138334" cy="578573"/>
+            </a:xfrm>
+            <a:prstGeom prst="rect">
+              <a:avLst/>
+            </a:prstGeom>
+            <a:solidFill>
+              <a:schemeClr val="accent5">
+                <a:lumMod val="20000"/>
+                <a:lumOff val="80000"/>
+              </a:schemeClr>
+            </a:solidFill>
+          </p:spPr>
+          <p:style>
+            <a:lnRef idx="1">
+              <a:schemeClr val="accent5"/>
+            </a:lnRef>
+            <a:fillRef idx="2">
+              <a:schemeClr val="accent5"/>
+            </a:fillRef>
+            <a:effectRef idx="1">
+              <a:schemeClr val="accent5"/>
+            </a:effectRef>
+            <a:fontRef idx="minor">
+              <a:schemeClr val="dk1"/>
+            </a:fontRef>
+          </p:style>
+          <p:txBody>
+            <a:bodyPr rtlCol="0" anchor="ctr"/>
+            <a:lstStyle/>
+            <a:p>
+              <a:pPr algn="ctr"/>
+              <a:endParaRPr lang="en-US" dirty="0"/>
+            </a:p>
+          </p:txBody>
+        </p:sp>
+        <p:pic>
+          <p:nvPicPr>
+            <p:cNvPr id="11" name="Picture 10">
+              <a:extLst>
+                <a:ext uri="{FF2B5EF4-FFF2-40B4-BE49-F238E27FC236}">
+                  <a16:creationId xmlns:a16="http://schemas.microsoft.com/office/drawing/2014/main" id="{833ABEA5-0835-4EFD-B80E-05A53548E547}"/>
+                </a:ext>
+              </a:extLst>
+            </p:cNvPr>
+            <p:cNvPicPr>
+              <a:picLocks noChangeAspect="1"/>
+            </p:cNvPicPr>
+            <p:nvPr/>
+          </p:nvPicPr>
+          <p:blipFill>
+            <a:blip r:embed="rId2"/>
+            <a:stretch>
+              <a:fillRect/>
+            </a:stretch>
+          </p:blipFill>
+          <p:spPr>
+            <a:xfrm>
+              <a:off x="547756" y="1124578"/>
+              <a:ext cx="1878208" cy="1077446"/>
+            </a:xfrm>
+            <a:prstGeom prst="rect">
+              <a:avLst/>
+            </a:prstGeom>
+          </p:spPr>
+        </p:pic>
+        <p:pic>
+          <p:nvPicPr>
+            <p:cNvPr id="13" name="Picture 12" descr="A picture containing text&#10;&#10;Description automatically generated">
+              <a:extLst>
+                <a:ext uri="{FF2B5EF4-FFF2-40B4-BE49-F238E27FC236}">
+                  <a16:creationId xmlns:a16="http://schemas.microsoft.com/office/drawing/2014/main" id="{8A72E5CE-C238-405A-A261-8B65C2B83617}"/>
+                </a:ext>
+              </a:extLst>
+            </p:cNvPr>
+            <p:cNvPicPr>
+              <a:picLocks noChangeAspect="1"/>
+            </p:cNvPicPr>
+            <p:nvPr/>
+          </p:nvPicPr>
+          <p:blipFill>
+            <a:blip r:embed="rId3">
+              <a:extLst>
+                <a:ext uri="{28A0092B-C50C-407E-A947-70E740481C1C}">
+                  <a14:useLocalDpi xmlns:a14="http://schemas.microsoft.com/office/drawing/2010/main" val="0"/>
+                </a:ext>
+              </a:extLst>
+            </a:blip>
+            <a:stretch>
+              <a:fillRect/>
+            </a:stretch>
+          </p:blipFill>
+          <p:spPr>
+            <a:xfrm>
+              <a:off x="8081038" y="1314299"/>
+              <a:ext cx="1385690" cy="698003"/>
+            </a:xfrm>
+            <a:prstGeom prst="rect">
+              <a:avLst/>
+            </a:prstGeom>
+          </p:spPr>
+        </p:pic>
+        <p:pic>
+          <p:nvPicPr>
+            <p:cNvPr id="14" name="Picture 13">
+              <a:extLst>
+                <a:ext uri="{FF2B5EF4-FFF2-40B4-BE49-F238E27FC236}">
+                  <a16:creationId xmlns:a16="http://schemas.microsoft.com/office/drawing/2014/main" id="{AA0C53AC-C4F3-42F6-B108-9B77A45C2CFB}"/>
+                </a:ext>
+              </a:extLst>
+            </p:cNvPr>
+            <p:cNvPicPr/>
+            <p:nvPr/>
+          </p:nvPicPr>
+          <p:blipFill>
+            <a:blip r:embed="rId4"/>
+            <a:stretch>
+              <a:fillRect/>
+            </a:stretch>
+          </p:blipFill>
+          <p:spPr>
+            <a:xfrm>
+              <a:off x="6502973" y="3679820"/>
+              <a:ext cx="1371600" cy="431165"/>
+            </a:xfrm>
+            <a:prstGeom prst="rect">
+              <a:avLst/>
+            </a:prstGeom>
+          </p:spPr>
+        </p:pic>
+        <p:pic>
+          <p:nvPicPr>
+            <p:cNvPr id="16" name="Picture 15">
+              <a:extLst>
+                <a:ext uri="{FF2B5EF4-FFF2-40B4-BE49-F238E27FC236}">
+                  <a16:creationId xmlns:a16="http://schemas.microsoft.com/office/drawing/2014/main" id="{81D4980E-AFD8-48F8-8D33-8E326B4928C9}"/>
+                </a:ext>
+              </a:extLst>
+            </p:cNvPr>
+            <p:cNvPicPr>
+              <a:picLocks noChangeAspect="1"/>
+            </p:cNvPicPr>
+            <p:nvPr/>
+          </p:nvPicPr>
+          <p:blipFill>
+            <a:blip r:embed="rId5"/>
+            <a:stretch>
+              <a:fillRect/>
+            </a:stretch>
+          </p:blipFill>
+          <p:spPr>
+            <a:xfrm>
+              <a:off x="9983699" y="3727431"/>
+              <a:ext cx="1385690" cy="341804"/>
+            </a:xfrm>
+            <a:prstGeom prst="rect">
+              <a:avLst/>
+            </a:prstGeom>
+          </p:spPr>
+        </p:pic>
+        <p:sp>
+          <p:nvSpPr>
+            <p:cNvPr id="17" name="Rectangle 16">
+              <a:extLst>
+                <a:ext uri="{FF2B5EF4-FFF2-40B4-BE49-F238E27FC236}">
+                  <a16:creationId xmlns:a16="http://schemas.microsoft.com/office/drawing/2014/main" id="{460CB18F-BBFA-4344-B306-5CFB6F54A47E}"/>
+                </a:ext>
+              </a:extLst>
+            </p:cNvPr>
+            <p:cNvSpPr/>
+            <p:nvPr/>
+          </p:nvSpPr>
+          <p:spPr>
+            <a:xfrm>
+              <a:off x="2724542" y="1382723"/>
+              <a:ext cx="1138334" cy="578573"/>
+            </a:xfrm>
+            <a:prstGeom prst="rect">
+              <a:avLst/>
+            </a:prstGeom>
+            <a:solidFill>
+              <a:schemeClr val="accent5">
+                <a:lumMod val="20000"/>
+                <a:lumOff val="80000"/>
+              </a:schemeClr>
+            </a:solidFill>
+          </p:spPr>
+          <p:style>
+            <a:lnRef idx="1">
+              <a:schemeClr val="accent5"/>
+            </a:lnRef>
+            <a:fillRef idx="2">
+              <a:schemeClr val="accent5"/>
+            </a:fillRef>
+            <a:effectRef idx="1">
+              <a:schemeClr val="accent5"/>
+            </a:effectRef>
+            <a:fontRef idx="minor">
+              <a:schemeClr val="dk1"/>
+            </a:fontRef>
+          </p:style>
+          <p:txBody>
+            <a:bodyPr rtlCol="0" anchor="ctr"/>
+            <a:lstStyle/>
+            <a:p>
+              <a:pPr algn="ctr"/>
+              <a:endParaRPr lang="en-US" dirty="0"/>
+            </a:p>
+          </p:txBody>
+        </p:sp>
+        <p:sp>
+          <p:nvSpPr>
+            <p:cNvPr id="18" name="TextBox 17">
+              <a:extLst>
+                <a:ext uri="{FF2B5EF4-FFF2-40B4-BE49-F238E27FC236}">
+                  <a16:creationId xmlns:a16="http://schemas.microsoft.com/office/drawing/2014/main" id="{6CC86B72-7A22-463A-A645-FFC2449450C6}"/>
+                </a:ext>
+              </a:extLst>
+            </p:cNvPr>
+            <p:cNvSpPr txBox="1"/>
+            <p:nvPr/>
+          </p:nvSpPr>
+          <p:spPr>
+            <a:xfrm>
+              <a:off x="2724542" y="1438076"/>
+              <a:ext cx="1138334" cy="523220"/>
+            </a:xfrm>
+            <a:prstGeom prst="rect">
+              <a:avLst/>
+            </a:prstGeom>
+            <a:noFill/>
+          </p:spPr>
+          <p:txBody>
+            <a:bodyPr wrap="square" rtlCol="0">
+              <a:spAutoFit/>
+            </a:bodyPr>
+            <a:lstStyle/>
+            <a:p>
+              <a:pPr algn="ctr"/>
+              <a:r>
+                <a:rPr lang="en-US" sz="1400" b="1" dirty="0"/>
+                <a:t>Rectangle </a:t>
+              </a:r>
+            </a:p>
+            <a:p>
+              <a:pPr algn="ctr"/>
+              <a:r>
+                <a:rPr lang="en-US" sz="1400" b="1" dirty="0"/>
+                <a:t>detection</a:t>
+              </a:r>
+            </a:p>
+          </p:txBody>
+        </p:sp>
+        <p:sp>
+          <p:nvSpPr>
+            <p:cNvPr id="19" name="TextBox 18">
+              <a:extLst>
+                <a:ext uri="{FF2B5EF4-FFF2-40B4-BE49-F238E27FC236}">
+                  <a16:creationId xmlns:a16="http://schemas.microsoft.com/office/drawing/2014/main" id="{31007203-F038-45D4-BBF4-4E55CF9D08E4}"/>
+                </a:ext>
+              </a:extLst>
+            </p:cNvPr>
+            <p:cNvSpPr txBox="1"/>
+            <p:nvPr/>
+          </p:nvSpPr>
+          <p:spPr>
+            <a:xfrm>
+              <a:off x="9983700" y="1396336"/>
+              <a:ext cx="1380929" cy="523220"/>
+            </a:xfrm>
+            <a:prstGeom prst="rect">
+              <a:avLst/>
+            </a:prstGeom>
+            <a:noFill/>
+          </p:spPr>
+          <p:txBody>
+            <a:bodyPr wrap="square" rtlCol="0">
+              <a:spAutoFit/>
+            </a:bodyPr>
+            <a:lstStyle/>
+            <a:p>
+              <a:pPr algn="ctr"/>
+              <a:r>
+                <a:rPr lang="en-US" sz="1400" b="1" dirty="0"/>
+                <a:t>Extract top and bottom parts</a:t>
+              </a:r>
+            </a:p>
+          </p:txBody>
+        </p:sp>
+        <p:sp>
+          <p:nvSpPr>
+            <p:cNvPr id="20" name="TextBox 19">
+              <a:extLst>
+                <a:ext uri="{FF2B5EF4-FFF2-40B4-BE49-F238E27FC236}">
+                  <a16:creationId xmlns:a16="http://schemas.microsoft.com/office/drawing/2014/main" id="{0C244B63-D510-4E28-904D-01BD747228FE}"/>
+                </a:ext>
+              </a:extLst>
+            </p:cNvPr>
+            <p:cNvSpPr txBox="1"/>
+            <p:nvPr/>
+          </p:nvSpPr>
+          <p:spPr>
+            <a:xfrm>
+              <a:off x="3862876" y="1377846"/>
+              <a:ext cx="1026367" cy="307777"/>
+            </a:xfrm>
+            <a:prstGeom prst="rect">
+              <a:avLst/>
+            </a:prstGeom>
+            <a:noFill/>
+          </p:spPr>
+          <p:txBody>
+            <a:bodyPr wrap="square" rtlCol="0">
+              <a:spAutoFit/>
+            </a:bodyPr>
+            <a:lstStyle/>
+            <a:p>
+              <a:pPr algn="ctr"/>
+              <a:r>
+                <a:rPr lang="en-US" sz="1400" dirty="0"/>
+                <a:t>candidates</a:t>
+              </a:r>
+            </a:p>
+          </p:txBody>
+        </p:sp>
+        <p:sp>
+          <p:nvSpPr>
+            <p:cNvPr id="21" name="TextBox 20">
+              <a:extLst>
+                <a:ext uri="{FF2B5EF4-FFF2-40B4-BE49-F238E27FC236}">
+                  <a16:creationId xmlns:a16="http://schemas.microsoft.com/office/drawing/2014/main" id="{696691DD-5EFE-4798-B2CF-B73EC23A0A50}"/>
+                </a:ext>
+              </a:extLst>
+            </p:cNvPr>
+            <p:cNvSpPr txBox="1"/>
+            <p:nvPr/>
+          </p:nvSpPr>
+          <p:spPr>
+            <a:xfrm>
+              <a:off x="4924156" y="1438076"/>
+              <a:ext cx="1026367" cy="523220"/>
+            </a:xfrm>
+            <a:prstGeom prst="rect">
+              <a:avLst/>
+            </a:prstGeom>
+            <a:noFill/>
+          </p:spPr>
+          <p:txBody>
+            <a:bodyPr wrap="square" rtlCol="0">
+              <a:spAutoFit/>
+            </a:bodyPr>
+            <a:lstStyle/>
+            <a:p>
+              <a:pPr algn="ctr"/>
+              <a:r>
+                <a:rPr lang="en-US" sz="1400" b="1" dirty="0"/>
+                <a:t>Size/Shape Filter</a:t>
+              </a:r>
+            </a:p>
+          </p:txBody>
+        </p:sp>
+        <p:sp>
+          <p:nvSpPr>
+            <p:cNvPr id="28" name="TextBox 27">
+              <a:extLst>
+                <a:ext uri="{FF2B5EF4-FFF2-40B4-BE49-F238E27FC236}">
+                  <a16:creationId xmlns:a16="http://schemas.microsoft.com/office/drawing/2014/main" id="{ABD99FE6-0FCE-44FD-9D78-73F2702B9899}"/>
+                </a:ext>
+              </a:extLst>
+            </p:cNvPr>
+            <p:cNvSpPr txBox="1"/>
+            <p:nvPr/>
+          </p:nvSpPr>
+          <p:spPr>
+            <a:xfrm>
+              <a:off x="9996141" y="2443373"/>
+              <a:ext cx="1380930" cy="738664"/>
+            </a:xfrm>
+            <a:prstGeom prst="rect">
+              <a:avLst/>
+            </a:prstGeom>
+            <a:noFill/>
+          </p:spPr>
+          <p:txBody>
+            <a:bodyPr wrap="square" rtlCol="0">
+              <a:spAutoFit/>
+            </a:bodyPr>
+            <a:lstStyle/>
+            <a:p>
+              <a:pPr algn="ctr"/>
+              <a:r>
+                <a:rPr lang="en-US" sz="1400" b="1" dirty="0"/>
+                <a:t>- Grayscale</a:t>
+              </a:r>
+            </a:p>
+            <a:p>
+              <a:pPr algn="ctr"/>
+              <a:r>
+                <a:rPr lang="en-US" altLang="zh-CN" sz="1400" b="1" dirty="0"/>
+                <a:t>- Edge detection - </a:t>
+              </a:r>
+              <a:r>
+                <a:rPr lang="en-US" sz="1400" b="1" dirty="0"/>
+                <a:t>Binarization</a:t>
+              </a:r>
+            </a:p>
+          </p:txBody>
+        </p:sp>
+        <p:sp>
+          <p:nvSpPr>
+            <p:cNvPr id="31" name="TextBox 30">
+              <a:extLst>
+                <a:ext uri="{FF2B5EF4-FFF2-40B4-BE49-F238E27FC236}">
+                  <a16:creationId xmlns:a16="http://schemas.microsoft.com/office/drawing/2014/main" id="{19ED3009-029E-4EDE-9CAC-1AAD8930BDA5}"/>
+                </a:ext>
+              </a:extLst>
+            </p:cNvPr>
+            <p:cNvSpPr txBox="1"/>
+            <p:nvPr/>
+          </p:nvSpPr>
+          <p:spPr>
+            <a:xfrm>
+              <a:off x="8375781" y="3633793"/>
+              <a:ext cx="934190" cy="523220"/>
+            </a:xfrm>
+            <a:prstGeom prst="rect">
+              <a:avLst/>
+            </a:prstGeom>
+            <a:noFill/>
+          </p:spPr>
+          <p:txBody>
+            <a:bodyPr wrap="square" rtlCol="0">
+              <a:spAutoFit/>
+            </a:bodyPr>
+            <a:lstStyle/>
+            <a:p>
+              <a:pPr algn="ctr"/>
+              <a:r>
+                <a:rPr lang="en-US" sz="1400" b="1" dirty="0"/>
+                <a:t>Sequence  extraction</a:t>
+              </a:r>
+            </a:p>
+          </p:txBody>
+        </p:sp>
+        <p:sp>
+          <p:nvSpPr>
+            <p:cNvPr id="33" name="Rectangle 32">
+              <a:extLst>
+                <a:ext uri="{FF2B5EF4-FFF2-40B4-BE49-F238E27FC236}">
+                  <a16:creationId xmlns:a16="http://schemas.microsoft.com/office/drawing/2014/main" id="{42C1E835-85BE-471F-AC6B-D78C645294D6}"/>
+                </a:ext>
+              </a:extLst>
+            </p:cNvPr>
+            <p:cNvSpPr/>
+            <p:nvPr/>
+          </p:nvSpPr>
+          <p:spPr>
+            <a:xfrm>
+              <a:off x="8254483" y="4913661"/>
+              <a:ext cx="1138334" cy="578573"/>
+            </a:xfrm>
+            <a:prstGeom prst="rect">
+              <a:avLst/>
+            </a:prstGeom>
+            <a:solidFill>
+              <a:schemeClr val="accent5">
+                <a:lumMod val="20000"/>
+                <a:lumOff val="80000"/>
+              </a:schemeClr>
+            </a:solidFill>
+          </p:spPr>
+          <p:style>
+            <a:lnRef idx="1">
+              <a:schemeClr val="accent5"/>
+            </a:lnRef>
+            <a:fillRef idx="2">
+              <a:schemeClr val="accent5"/>
+            </a:fillRef>
+            <a:effectRef idx="1">
+              <a:schemeClr val="accent5"/>
+            </a:effectRef>
+            <a:fontRef idx="minor">
+              <a:schemeClr val="dk1"/>
+            </a:fontRef>
+          </p:style>
+          <p:txBody>
+            <a:bodyPr rtlCol="0" anchor="ctr"/>
+            <a:lstStyle/>
+            <a:p>
+              <a:pPr algn="ctr"/>
+              <a:endParaRPr lang="en-US" dirty="0"/>
+            </a:p>
+          </p:txBody>
+        </p:sp>
+        <p:sp>
+          <p:nvSpPr>
+            <p:cNvPr id="34" name="TextBox 33">
+              <a:extLst>
+                <a:ext uri="{FF2B5EF4-FFF2-40B4-BE49-F238E27FC236}">
+                  <a16:creationId xmlns:a16="http://schemas.microsoft.com/office/drawing/2014/main" id="{42485960-001A-48FE-AB1C-E1C52514C822}"/>
+                </a:ext>
+              </a:extLst>
+            </p:cNvPr>
+            <p:cNvSpPr txBox="1"/>
+            <p:nvPr/>
+          </p:nvSpPr>
+          <p:spPr>
+            <a:xfrm>
+              <a:off x="8375781" y="4964200"/>
+              <a:ext cx="923730" cy="523220"/>
+            </a:xfrm>
+            <a:prstGeom prst="rect">
+              <a:avLst/>
+            </a:prstGeom>
+            <a:noFill/>
+          </p:spPr>
+          <p:txBody>
+            <a:bodyPr wrap="square" rtlCol="0">
+              <a:spAutoFit/>
+            </a:bodyPr>
+            <a:lstStyle/>
+            <a:p>
+              <a:pPr algn="ctr"/>
+              <a:r>
+                <a:rPr lang="en-US" sz="1400" b="1" dirty="0"/>
+                <a:t>RGB/HSV Info</a:t>
+              </a:r>
+            </a:p>
+          </p:txBody>
+        </p:sp>
+        <p:sp>
+          <p:nvSpPr>
+            <p:cNvPr id="35" name="TextBox 34">
+              <a:extLst>
+                <a:ext uri="{FF2B5EF4-FFF2-40B4-BE49-F238E27FC236}">
+                  <a16:creationId xmlns:a16="http://schemas.microsoft.com/office/drawing/2014/main" id="{1B6C4763-84C1-4E5F-A2FF-49E4530DF81A}"/>
+                </a:ext>
+              </a:extLst>
+            </p:cNvPr>
+            <p:cNvSpPr txBox="1"/>
+            <p:nvPr/>
+          </p:nvSpPr>
+          <p:spPr>
+            <a:xfrm>
+              <a:off x="9434030" y="4935666"/>
+              <a:ext cx="594048" cy="307777"/>
+            </a:xfrm>
+            <a:prstGeom prst="rect">
+              <a:avLst/>
+            </a:prstGeom>
+            <a:noFill/>
+          </p:spPr>
+          <p:txBody>
+            <a:bodyPr wrap="square" rtlCol="0">
+              <a:spAutoFit/>
+            </a:bodyPr>
+            <a:lstStyle/>
+            <a:p>
+              <a:pPr algn="ctr"/>
+              <a:r>
+                <a:rPr lang="en-US" sz="1400" dirty="0"/>
+                <a:t>MA</a:t>
+              </a:r>
+            </a:p>
+          </p:txBody>
+        </p:sp>
+        <p:sp>
+          <p:nvSpPr>
+            <p:cNvPr id="48" name="Rectangle 47">
+              <a:extLst>
+                <a:ext uri="{FF2B5EF4-FFF2-40B4-BE49-F238E27FC236}">
+                  <a16:creationId xmlns:a16="http://schemas.microsoft.com/office/drawing/2014/main" id="{BEFD1B86-7270-43E9-81C4-752421354422}"/>
+                </a:ext>
+              </a:extLst>
+            </p:cNvPr>
+            <p:cNvSpPr/>
+            <p:nvPr/>
+          </p:nvSpPr>
+          <p:spPr>
+            <a:xfrm>
+              <a:off x="4837710" y="3606116"/>
+              <a:ext cx="1420721" cy="578573"/>
+            </a:xfrm>
+            <a:prstGeom prst="rect">
+              <a:avLst/>
+            </a:prstGeom>
+            <a:solidFill>
+              <a:schemeClr val="accent5">
+                <a:lumMod val="20000"/>
+                <a:lumOff val="80000"/>
+              </a:schemeClr>
+            </a:solidFill>
+          </p:spPr>
+          <p:style>
+            <a:lnRef idx="1">
+              <a:schemeClr val="accent5"/>
+            </a:lnRef>
+            <a:fillRef idx="2">
+              <a:schemeClr val="accent5"/>
+            </a:fillRef>
+            <a:effectRef idx="1">
+              <a:schemeClr val="accent5"/>
+            </a:effectRef>
+            <a:fontRef idx="minor">
+              <a:schemeClr val="dk1"/>
+            </a:fontRef>
+          </p:style>
+          <p:txBody>
+            <a:bodyPr rtlCol="0" anchor="ctr"/>
+            <a:lstStyle/>
+            <a:p>
+              <a:pPr algn="ctr"/>
+              <a:endParaRPr lang="en-US" dirty="0"/>
+            </a:p>
+          </p:txBody>
+        </p:sp>
+        <p:sp>
+          <p:nvSpPr>
+            <p:cNvPr id="49" name="TextBox 48">
+              <a:extLst>
+                <a:ext uri="{FF2B5EF4-FFF2-40B4-BE49-F238E27FC236}">
+                  <a16:creationId xmlns:a16="http://schemas.microsoft.com/office/drawing/2014/main" id="{7C8C3206-CBC5-4577-984C-E6E5571B6FAD}"/>
+                </a:ext>
+              </a:extLst>
+            </p:cNvPr>
+            <p:cNvSpPr txBox="1"/>
+            <p:nvPr/>
+          </p:nvSpPr>
+          <p:spPr>
+            <a:xfrm>
+              <a:off x="4936885" y="3633792"/>
+              <a:ext cx="1222369" cy="523220"/>
+            </a:xfrm>
+            <a:prstGeom prst="rect">
+              <a:avLst/>
+            </a:prstGeom>
+            <a:noFill/>
+          </p:spPr>
+          <p:txBody>
+            <a:bodyPr wrap="square" rtlCol="0">
+              <a:spAutoFit/>
+            </a:bodyPr>
+            <a:lstStyle/>
+            <a:p>
+              <a:pPr algn="ctr"/>
+              <a:r>
+                <a:rPr lang="en-US" sz="1400" b="1" dirty="0"/>
+                <a:t>Character segmentation</a:t>
+              </a:r>
+            </a:p>
+          </p:txBody>
+        </p:sp>
+        <p:pic>
+          <p:nvPicPr>
+            <p:cNvPr id="51" name="Picture 50">
+              <a:extLst>
+                <a:ext uri="{FF2B5EF4-FFF2-40B4-BE49-F238E27FC236}">
+                  <a16:creationId xmlns:a16="http://schemas.microsoft.com/office/drawing/2014/main" id="{9CD713D4-58E1-4E7B-B161-B105EF38B417}"/>
+                </a:ext>
+              </a:extLst>
+            </p:cNvPr>
+            <p:cNvPicPr>
+              <a:picLocks noChangeAspect="1"/>
+            </p:cNvPicPr>
+            <p:nvPr/>
+          </p:nvPicPr>
+          <p:blipFill>
+            <a:blip r:embed="rId6"/>
+            <a:stretch>
+              <a:fillRect/>
+            </a:stretch>
+          </p:blipFill>
+          <p:spPr>
+            <a:xfrm>
+              <a:off x="3969498" y="2878541"/>
+              <a:ext cx="242670" cy="2035120"/>
+            </a:xfrm>
+            <a:prstGeom prst="rect">
+              <a:avLst/>
+            </a:prstGeom>
+          </p:spPr>
+        </p:pic>
+        <p:sp>
+          <p:nvSpPr>
+            <p:cNvPr id="56" name="TextBox 55">
+              <a:extLst>
+                <a:ext uri="{FF2B5EF4-FFF2-40B4-BE49-F238E27FC236}">
+                  <a16:creationId xmlns:a16="http://schemas.microsoft.com/office/drawing/2014/main" id="{401C68DE-FA0B-4630-8E25-F1F67B6EE692}"/>
+                </a:ext>
+              </a:extLst>
+            </p:cNvPr>
+            <p:cNvSpPr txBox="1"/>
+            <p:nvPr/>
+          </p:nvSpPr>
+          <p:spPr>
+            <a:xfrm>
+              <a:off x="805706" y="3700128"/>
+              <a:ext cx="1167690" cy="369332"/>
+            </a:xfrm>
+            <a:prstGeom prst="rect">
+              <a:avLst/>
+            </a:prstGeom>
+            <a:noFill/>
+          </p:spPr>
+          <p:txBody>
+            <a:bodyPr wrap="square" rtlCol="0">
+              <a:spAutoFit/>
+            </a:bodyPr>
+            <a:lstStyle/>
+            <a:p>
+              <a:pPr algn="ctr"/>
+              <a:r>
+                <a:rPr lang="en-US" b="1" dirty="0"/>
+                <a:t>1 H J F 6 4</a:t>
+              </a:r>
+            </a:p>
+          </p:txBody>
+        </p:sp>
+        <p:sp>
+          <p:nvSpPr>
+            <p:cNvPr id="60" name="Arrow: Right 59">
+              <a:extLst>
+                <a:ext uri="{FF2B5EF4-FFF2-40B4-BE49-F238E27FC236}">
+                  <a16:creationId xmlns:a16="http://schemas.microsoft.com/office/drawing/2014/main" id="{F3BF1157-B1EE-4CF2-B324-2F4C37FDB307}"/>
+                </a:ext>
+              </a:extLst>
+            </p:cNvPr>
+            <p:cNvSpPr/>
+            <p:nvPr/>
+          </p:nvSpPr>
+          <p:spPr>
+            <a:xfrm rot="5400000">
+              <a:off x="8041835" y="2641180"/>
+              <a:ext cx="1455177" cy="291919"/>
+            </a:xfrm>
+            <a:prstGeom prst="rightArrow">
+              <a:avLst/>
+            </a:prstGeom>
+          </p:spPr>
+          <p:style>
+            <a:lnRef idx="1">
+              <a:schemeClr val="accent3"/>
+            </a:lnRef>
+            <a:fillRef idx="2">
+              <a:schemeClr val="accent3"/>
+            </a:fillRef>
+            <a:effectRef idx="1">
+              <a:schemeClr val="accent3"/>
+            </a:effectRef>
+            <a:fontRef idx="minor">
+              <a:schemeClr val="dk1"/>
+            </a:fontRef>
+          </p:style>
+          <p:txBody>
+            <a:bodyPr rtlCol="0" anchor="ctr"/>
+            <a:lstStyle/>
+            <a:p>
+              <a:pPr algn="ctr"/>
+              <a:endParaRPr lang="en-US"/>
+            </a:p>
+          </p:txBody>
+        </p:sp>
+        <p:sp>
+          <p:nvSpPr>
+            <p:cNvPr id="61" name="Arrow: Right 60">
+              <a:extLst>
+                <a:ext uri="{FF2B5EF4-FFF2-40B4-BE49-F238E27FC236}">
+                  <a16:creationId xmlns:a16="http://schemas.microsoft.com/office/drawing/2014/main" id="{6640F5E4-1E28-47B0-A1F4-B005C851750F}"/>
+                </a:ext>
+              </a:extLst>
+            </p:cNvPr>
+            <p:cNvSpPr/>
+            <p:nvPr/>
+          </p:nvSpPr>
+          <p:spPr>
+            <a:xfrm rot="16200000">
+              <a:off x="8506303" y="4348085"/>
+              <a:ext cx="578572" cy="291919"/>
+            </a:xfrm>
+            <a:prstGeom prst="rightArrow">
+              <a:avLst/>
+            </a:prstGeom>
+          </p:spPr>
+          <p:style>
+            <a:lnRef idx="1">
+              <a:schemeClr val="accent3"/>
+            </a:lnRef>
+            <a:fillRef idx="2">
+              <a:schemeClr val="accent3"/>
+            </a:fillRef>
+            <a:effectRef idx="1">
+              <a:schemeClr val="accent3"/>
+            </a:effectRef>
+            <a:fontRef idx="minor">
+              <a:schemeClr val="dk1"/>
+            </a:fontRef>
+          </p:style>
+          <p:txBody>
+            <a:bodyPr rtlCol="0" anchor="ctr"/>
+            <a:lstStyle/>
+            <a:p>
+              <a:pPr algn="ctr"/>
+              <a:endParaRPr lang="en-US"/>
+            </a:p>
+          </p:txBody>
+        </p:sp>
+        <p:grpSp>
+          <p:nvGrpSpPr>
+            <p:cNvPr id="2" name="Group 1">
+              <a:extLst>
+                <a:ext uri="{FF2B5EF4-FFF2-40B4-BE49-F238E27FC236}">
+                  <a16:creationId xmlns:a16="http://schemas.microsoft.com/office/drawing/2014/main" id="{DBEBC319-6E2C-4B18-A358-D52504FE6A43}"/>
+                </a:ext>
+              </a:extLst>
+            </p:cNvPr>
+            <p:cNvGrpSpPr/>
+            <p:nvPr/>
+          </p:nvGrpSpPr>
+          <p:grpSpPr>
+            <a:xfrm>
+              <a:off x="10126829" y="4666096"/>
+              <a:ext cx="1465403" cy="954107"/>
+              <a:chOff x="10126829" y="4666096"/>
+              <a:chExt cx="1768929" cy="954107"/>
+            </a:xfrm>
+          </p:grpSpPr>
+          <p:sp>
+            <p:nvSpPr>
+              <p:cNvPr id="25" name="Rectangle 24">
+                <a:extLst>
+                  <a:ext uri="{FF2B5EF4-FFF2-40B4-BE49-F238E27FC236}">
+                    <a16:creationId xmlns:a16="http://schemas.microsoft.com/office/drawing/2014/main" id="{A37F9546-2095-46F4-8458-2681068754FA}"/>
+                  </a:ext>
+                </a:extLst>
+              </p:cNvPr>
+              <p:cNvSpPr/>
+              <p:nvPr/>
+            </p:nvSpPr>
+            <p:spPr>
+              <a:xfrm>
+                <a:off x="10126829" y="4666096"/>
+                <a:ext cx="1762162" cy="954107"/>
+              </a:xfrm>
+              <a:prstGeom prst="rect">
+                <a:avLst/>
+              </a:prstGeom>
+            </p:spPr>
+            <p:style>
+              <a:lnRef idx="1">
+                <a:schemeClr val="accent4"/>
+              </a:lnRef>
+              <a:fillRef idx="2">
+                <a:schemeClr val="accent4"/>
+              </a:fillRef>
+              <a:effectRef idx="1">
+                <a:schemeClr val="accent4"/>
+              </a:effectRef>
+              <a:fontRef idx="minor">
+                <a:schemeClr val="dk1"/>
+              </a:fontRef>
+            </p:style>
+            <p:txBody>
+              <a:bodyPr rtlCol="0" anchor="ctr"/>
+              <a:lstStyle/>
+              <a:p>
+                <a:pPr algn="ctr"/>
+                <a:endParaRPr lang="en-US" dirty="0"/>
+              </a:p>
+            </p:txBody>
+          </p:sp>
+          <p:sp>
+            <p:nvSpPr>
+              <p:cNvPr id="40" name="TextBox 39">
+                <a:extLst>
+                  <a:ext uri="{FF2B5EF4-FFF2-40B4-BE49-F238E27FC236}">
+                    <a16:creationId xmlns:a16="http://schemas.microsoft.com/office/drawing/2014/main" id="{22BFCB8B-28A8-432B-91A6-74A1AAD33EEF}"/>
+                  </a:ext>
+                </a:extLst>
+              </p:cNvPr>
+              <p:cNvSpPr txBox="1"/>
+              <p:nvPr/>
+            </p:nvSpPr>
+            <p:spPr>
+              <a:xfrm>
+                <a:off x="10133595" y="4838535"/>
+                <a:ext cx="1762163" cy="738664"/>
+              </a:xfrm>
+              <a:prstGeom prst="rect">
+                <a:avLst/>
+              </a:prstGeom>
+              <a:noFill/>
+            </p:spPr>
+            <p:txBody>
+              <a:bodyPr wrap="square" rtlCol="0">
+                <a:spAutoFit/>
+              </a:bodyPr>
+              <a:lstStyle/>
+              <a:p>
+                <a:pPr algn="ctr"/>
+                <a:r>
+                  <a:rPr lang="en-US" sz="1400" b="1" dirty="0"/>
+                  <a:t>SRN</a:t>
+                </a:r>
+              </a:p>
+              <a:p>
+                <a:pPr algn="ctr"/>
+                <a:r>
+                  <a:rPr lang="en-US" sz="1400" dirty="0"/>
+                  <a:t>State Recognition Net</a:t>
+                </a:r>
+              </a:p>
+            </p:txBody>
+          </p:sp>
+        </p:grpSp>
+        <p:grpSp>
+          <p:nvGrpSpPr>
+            <p:cNvPr id="42" name="Group 41">
+              <a:extLst>
+                <a:ext uri="{FF2B5EF4-FFF2-40B4-BE49-F238E27FC236}">
+                  <a16:creationId xmlns:a16="http://schemas.microsoft.com/office/drawing/2014/main" id="{99B3F1A3-0B5C-4067-927A-E0499925D49F}"/>
+                </a:ext>
+              </a:extLst>
+            </p:cNvPr>
+            <p:cNvGrpSpPr/>
+            <p:nvPr/>
+          </p:nvGrpSpPr>
+          <p:grpSpPr>
+            <a:xfrm>
+              <a:off x="6404949" y="1180891"/>
+              <a:ext cx="1361920" cy="954107"/>
+              <a:chOff x="10126829" y="4666096"/>
+              <a:chExt cx="1768929" cy="954107"/>
+            </a:xfrm>
+          </p:grpSpPr>
+          <p:sp>
+            <p:nvSpPr>
+              <p:cNvPr id="43" name="Rectangle 42">
+                <a:extLst>
+                  <a:ext uri="{FF2B5EF4-FFF2-40B4-BE49-F238E27FC236}">
+                    <a16:creationId xmlns:a16="http://schemas.microsoft.com/office/drawing/2014/main" id="{FC265985-3DC0-48AF-A330-C4D8E5432A48}"/>
+                  </a:ext>
+                </a:extLst>
+              </p:cNvPr>
+              <p:cNvSpPr/>
+              <p:nvPr/>
+            </p:nvSpPr>
+            <p:spPr>
+              <a:xfrm>
+                <a:off x="10126829" y="4666096"/>
+                <a:ext cx="1762162" cy="954107"/>
+              </a:xfrm>
+              <a:prstGeom prst="rect">
+                <a:avLst/>
+              </a:prstGeom>
+            </p:spPr>
+            <p:style>
+              <a:lnRef idx="1">
+                <a:schemeClr val="accent4"/>
+              </a:lnRef>
+              <a:fillRef idx="2">
+                <a:schemeClr val="accent4"/>
+              </a:fillRef>
+              <a:effectRef idx="1">
+                <a:schemeClr val="accent4"/>
+              </a:effectRef>
+              <a:fontRef idx="minor">
+                <a:schemeClr val="dk1"/>
+              </a:fontRef>
+            </p:style>
+            <p:txBody>
+              <a:bodyPr rtlCol="0" anchor="ctr"/>
+              <a:lstStyle/>
+              <a:p>
+                <a:pPr algn="ctr"/>
+                <a:endParaRPr lang="en-US" dirty="0"/>
+              </a:p>
+            </p:txBody>
+          </p:sp>
+          <p:sp>
+            <p:nvSpPr>
+              <p:cNvPr id="44" name="TextBox 43">
+                <a:extLst>
+                  <a:ext uri="{FF2B5EF4-FFF2-40B4-BE49-F238E27FC236}">
+                    <a16:creationId xmlns:a16="http://schemas.microsoft.com/office/drawing/2014/main" id="{6EA1508E-4A43-489B-A00D-644B29034556}"/>
+                  </a:ext>
+                </a:extLst>
+              </p:cNvPr>
+              <p:cNvSpPr txBox="1"/>
+              <p:nvPr/>
+            </p:nvSpPr>
+            <p:spPr>
+              <a:xfrm>
+                <a:off x="10133595" y="4838535"/>
+                <a:ext cx="1762163" cy="523220"/>
+              </a:xfrm>
+              <a:prstGeom prst="rect">
+                <a:avLst/>
+              </a:prstGeom>
+              <a:noFill/>
+            </p:spPr>
+            <p:txBody>
+              <a:bodyPr wrap="square" rtlCol="0">
+                <a:spAutoFit/>
+              </a:bodyPr>
+              <a:lstStyle/>
+              <a:p>
+                <a:pPr algn="ctr"/>
+                <a:r>
+                  <a:rPr lang="en-US" sz="1400" b="1" dirty="0"/>
+                  <a:t>PVN</a:t>
+                </a:r>
+              </a:p>
+              <a:p>
+                <a:pPr algn="ctr"/>
+                <a:r>
+                  <a:rPr lang="en-US" sz="1400" dirty="0"/>
+                  <a:t>Plate Validation Net</a:t>
+                </a:r>
+              </a:p>
+            </p:txBody>
+          </p:sp>
+        </p:grpSp>
+        <p:grpSp>
+          <p:nvGrpSpPr>
+            <p:cNvPr id="45" name="Group 44">
+              <a:extLst>
+                <a:ext uri="{FF2B5EF4-FFF2-40B4-BE49-F238E27FC236}">
+                  <a16:creationId xmlns:a16="http://schemas.microsoft.com/office/drawing/2014/main" id="{D14D4984-DD7B-464F-B232-80F1CCC0CD3D}"/>
+                </a:ext>
+              </a:extLst>
+            </p:cNvPr>
+            <p:cNvGrpSpPr/>
+            <p:nvPr/>
+          </p:nvGrpSpPr>
+          <p:grpSpPr>
+            <a:xfrm>
+              <a:off x="2275902" y="3418348"/>
+              <a:ext cx="1493492" cy="954107"/>
+              <a:chOff x="10126829" y="4666096"/>
+              <a:chExt cx="1768929" cy="954107"/>
+            </a:xfrm>
+          </p:grpSpPr>
+          <p:sp>
+            <p:nvSpPr>
+              <p:cNvPr id="46" name="Rectangle 45">
+                <a:extLst>
+                  <a:ext uri="{FF2B5EF4-FFF2-40B4-BE49-F238E27FC236}">
+                    <a16:creationId xmlns:a16="http://schemas.microsoft.com/office/drawing/2014/main" id="{624EF228-4C27-4231-B5B1-2686B4E4ABDF}"/>
+                  </a:ext>
+                </a:extLst>
+              </p:cNvPr>
+              <p:cNvSpPr/>
+              <p:nvPr/>
+            </p:nvSpPr>
+            <p:spPr>
+              <a:xfrm>
+                <a:off x="10126829" y="4666096"/>
+                <a:ext cx="1762162" cy="954107"/>
+              </a:xfrm>
+              <a:prstGeom prst="rect">
+                <a:avLst/>
+              </a:prstGeom>
+            </p:spPr>
+            <p:style>
+              <a:lnRef idx="1">
+                <a:schemeClr val="accent4"/>
+              </a:lnRef>
+              <a:fillRef idx="2">
+                <a:schemeClr val="accent4"/>
+              </a:fillRef>
+              <a:effectRef idx="1">
+                <a:schemeClr val="accent4"/>
+              </a:effectRef>
+              <a:fontRef idx="minor">
+                <a:schemeClr val="dk1"/>
+              </a:fontRef>
+            </p:style>
+            <p:txBody>
+              <a:bodyPr rtlCol="0" anchor="ctr"/>
+              <a:lstStyle/>
+              <a:p>
+                <a:pPr algn="ctr"/>
+                <a:endParaRPr lang="en-US" dirty="0"/>
+              </a:p>
+            </p:txBody>
+          </p:sp>
+          <p:sp>
+            <p:nvSpPr>
+              <p:cNvPr id="47" name="TextBox 46">
+                <a:extLst>
+                  <a:ext uri="{FF2B5EF4-FFF2-40B4-BE49-F238E27FC236}">
+                    <a16:creationId xmlns:a16="http://schemas.microsoft.com/office/drawing/2014/main" id="{66608569-D248-4F30-8086-819D168828D0}"/>
+                  </a:ext>
+                </a:extLst>
+              </p:cNvPr>
+              <p:cNvSpPr txBox="1"/>
+              <p:nvPr/>
+            </p:nvSpPr>
+            <p:spPr>
+              <a:xfrm>
+                <a:off x="10133595" y="4838535"/>
+                <a:ext cx="1762163" cy="738664"/>
+              </a:xfrm>
+              <a:prstGeom prst="rect">
+                <a:avLst/>
+              </a:prstGeom>
+              <a:noFill/>
+            </p:spPr>
+            <p:txBody>
+              <a:bodyPr wrap="square" rtlCol="0">
+                <a:spAutoFit/>
+              </a:bodyPr>
+              <a:lstStyle/>
+              <a:p>
+                <a:pPr algn="ctr"/>
+                <a:r>
+                  <a:rPr lang="en-US" sz="1400" b="1" dirty="0"/>
+                  <a:t>CRN</a:t>
+                </a:r>
+              </a:p>
+              <a:p>
+                <a:pPr algn="ctr"/>
+                <a:r>
+                  <a:rPr lang="en-US" sz="1400" dirty="0"/>
+                  <a:t>Char Recognition Net</a:t>
+                </a:r>
+              </a:p>
+            </p:txBody>
+          </p:sp>
+        </p:grpSp>
+      </p:grpSp>
     </p:spTree>
     <p:extLst>
       <p:ext uri="{BB962C8B-B14F-4D97-AF65-F5344CB8AC3E}">

</xml_diff>